<commit_message>
Update mainly for PharmaSUG e-Poster, 2020
</commit_message>
<xml_diff>
--- a/Posters/PharmaSUG 2020 - Paper EP-172.pptx
+++ b/Posters/PharmaSUG 2020 - Paper EP-172.pptx
@@ -223,7 +223,7 @@
           <a:p>
             <a:fld id="{F639A1A9-5583-FC45-AC93-6F440A88C802}" type="datetimeFigureOut">
               <a:rPr lang="en-US" smtClean="0"/>
-              <a:t>4/11/2020</a:t>
+              <a:t>4/23/2020</a:t>
             </a:fld>
             <a:endParaRPr lang="en-US"/>
           </a:p>
@@ -842,6 +842,1155 @@
 
 <file path=ppt/slideLayouts/slideLayout10.xml><?xml version="1.0" encoding="utf-8"?>
 <p:sldLayout xmlns:a="http://schemas.openxmlformats.org/drawingml/2006/main" xmlns:r="http://schemas.openxmlformats.org/officeDocument/2006/relationships" xmlns:p="http://schemas.openxmlformats.org/presentationml/2006/main" preserve="1" userDrawn="1">
+  <p:cSld name="2_Custom Layout">
+    <p:spTree>
+      <p:nvGrpSpPr>
+        <p:cNvPr id="1" name=""/>
+        <p:cNvGrpSpPr/>
+        <p:nvPr/>
+      </p:nvGrpSpPr>
+      <p:grpSpPr>
+        <a:xfrm>
+          <a:off x="0" y="0"/>
+          <a:ext cx="0" cy="0"/>
+          <a:chOff x="0" y="0"/>
+          <a:chExt cx="0" cy="0"/>
+        </a:xfrm>
+      </p:grpSpPr>
+      <p:sp>
+        <p:nvSpPr>
+          <p:cNvPr id="18" name="Title Placeholder 1"/>
+          <p:cNvSpPr>
+            <a:spLocks noGrp="1"/>
+          </p:cNvSpPr>
+          <p:nvPr>
+            <p:ph type="title"/>
+          </p:nvPr>
+        </p:nvSpPr>
+        <p:spPr>
+          <a:xfrm>
+            <a:off x="6297988" y="608473"/>
+            <a:ext cx="26056340" cy="2674042"/>
+          </a:xfrm>
+          <a:prstGeom prst="rect">
+            <a:avLst/>
+          </a:prstGeom>
+        </p:spPr>
+        <p:txBody>
+          <a:bodyPr vert="horz" lIns="102581" tIns="51291" rIns="102581" bIns="51291" rtlCol="0" anchor="ctr">
+            <a:normAutofit/>
+          </a:bodyPr>
+          <a:lstStyle/>
+          <a:p>
+            <a:r>
+              <a:rPr lang="en-US"/>
+              <a:t>Click to edit Master title style</a:t>
+            </a:r>
+            <a:endParaRPr lang="en-US" dirty="0"/>
+          </a:p>
+        </p:txBody>
+      </p:sp>
+      <p:sp>
+        <p:nvSpPr>
+          <p:cNvPr id="15" name="Content Placeholder 4">
+            <a:extLst>
+              <a:ext uri="{FF2B5EF4-FFF2-40B4-BE49-F238E27FC236}">
+                <a16:creationId xmlns:a16="http://schemas.microsoft.com/office/drawing/2014/main" id="{7EFB7D21-DA52-4390-A518-9E2A7217A4FB}"/>
+              </a:ext>
+            </a:extLst>
+          </p:cNvPr>
+          <p:cNvSpPr>
+            <a:spLocks noGrp="1"/>
+          </p:cNvSpPr>
+          <p:nvPr>
+            <p:ph sz="quarter" idx="17"/>
+          </p:nvPr>
+        </p:nvSpPr>
+        <p:spPr>
+          <a:xfrm>
+            <a:off x="342379" y="5638794"/>
+            <a:ext cx="11773421" cy="14097006"/>
+          </a:xfrm>
+          <a:prstGeom prst="rect">
+            <a:avLst/>
+          </a:prstGeom>
+          <a:solidFill>
+            <a:schemeClr val="bg1"/>
+          </a:solidFill>
+        </p:spPr>
+        <p:txBody>
+          <a:bodyPr lIns="102669" tIns="51334" rIns="102669" bIns="51334"/>
+          <a:lstStyle>
+            <a:lvl1pPr marL="857250" indent="-857250">
+              <a:buFont typeface="Arial" panose="020B0604020202020204" pitchFamily="34" charset="0"/>
+              <a:buChar char="•"/>
+              <a:defRPr>
+                <a:solidFill>
+                  <a:srgbClr val="002060"/>
+                </a:solidFill>
+              </a:defRPr>
+            </a:lvl1pPr>
+            <a:lvl2pPr marL="1781175" indent="-914400">
+              <a:buFont typeface="Arial" panose="020B0604020202020204" pitchFamily="34" charset="0"/>
+              <a:buChar char="•"/>
+              <a:defRPr sz="6200">
+                <a:solidFill>
+                  <a:srgbClr val="002060"/>
+                </a:solidFill>
+              </a:defRPr>
+            </a:lvl2pPr>
+            <a:lvl3pPr marL="2790825" indent="-962025">
+              <a:buFont typeface="Arial" panose="020B0604020202020204" pitchFamily="34" charset="0"/>
+              <a:buChar char="•"/>
+              <a:defRPr sz="5800">
+                <a:solidFill>
+                  <a:srgbClr val="002060"/>
+                </a:solidFill>
+                <a:latin typeface="Arial"/>
+                <a:cs typeface="Arial"/>
+              </a:defRPr>
+            </a:lvl3pPr>
+            <a:lvl4pPr marL="3657600" indent="-914400">
+              <a:buFont typeface="Arial" panose="020B0604020202020204" pitchFamily="34" charset="0"/>
+              <a:buChar char="•"/>
+              <a:defRPr sz="5800">
+                <a:solidFill>
+                  <a:srgbClr val="002060"/>
+                </a:solidFill>
+              </a:defRPr>
+            </a:lvl4pPr>
+            <a:lvl5pPr marL="4619625" indent="-914400">
+              <a:buFont typeface="Arial" panose="020B0604020202020204" pitchFamily="34" charset="0"/>
+              <a:buChar char="•"/>
+              <a:defRPr sz="5500">
+                <a:solidFill>
+                  <a:srgbClr val="002060"/>
+                </a:solidFill>
+              </a:defRPr>
+            </a:lvl5pPr>
+          </a:lstStyle>
+          <a:p>
+            <a:pPr lvl="0"/>
+            <a:r>
+              <a:rPr lang="en-US"/>
+              <a:t>Edit Master text styles</a:t>
+            </a:r>
+          </a:p>
+          <a:p>
+            <a:pPr lvl="1"/>
+            <a:r>
+              <a:rPr lang="en-US"/>
+              <a:t>Second level</a:t>
+            </a:r>
+          </a:p>
+          <a:p>
+            <a:pPr lvl="2"/>
+            <a:r>
+              <a:rPr lang="en-US"/>
+              <a:t>Third level</a:t>
+            </a:r>
+          </a:p>
+          <a:p>
+            <a:pPr lvl="3"/>
+            <a:r>
+              <a:rPr lang="en-US"/>
+              <a:t>Fourth level</a:t>
+            </a:r>
+          </a:p>
+          <a:p>
+            <a:pPr lvl="4"/>
+            <a:r>
+              <a:rPr lang="en-US"/>
+              <a:t>Fifth level</a:t>
+            </a:r>
+            <a:endParaRPr lang="en-US" dirty="0"/>
+          </a:p>
+        </p:txBody>
+      </p:sp>
+      <p:sp>
+        <p:nvSpPr>
+          <p:cNvPr id="19" name="Content Placeholder 4">
+            <a:extLst>
+              <a:ext uri="{FF2B5EF4-FFF2-40B4-BE49-F238E27FC236}">
+                <a16:creationId xmlns:a16="http://schemas.microsoft.com/office/drawing/2014/main" id="{3EC148E9-FD4E-4E86-A803-E4B3BA8BC877}"/>
+              </a:ext>
+            </a:extLst>
+          </p:cNvPr>
+          <p:cNvSpPr>
+            <a:spLocks noGrp="1"/>
+          </p:cNvSpPr>
+          <p:nvPr>
+            <p:ph sz="quarter" idx="18"/>
+          </p:nvPr>
+        </p:nvSpPr>
+        <p:spPr>
+          <a:xfrm>
+            <a:off x="25347168" y="5638794"/>
+            <a:ext cx="11773421" cy="14121074"/>
+          </a:xfrm>
+          <a:prstGeom prst="rect">
+            <a:avLst/>
+          </a:prstGeom>
+          <a:solidFill>
+            <a:schemeClr val="bg1"/>
+          </a:solidFill>
+        </p:spPr>
+        <p:txBody>
+          <a:bodyPr lIns="102669" tIns="51334" rIns="102669" bIns="51334"/>
+          <a:lstStyle>
+            <a:lvl1pPr marL="857250" indent="-857250">
+              <a:buFont typeface="Arial" panose="020B0604020202020204" pitchFamily="34" charset="0"/>
+              <a:buChar char="•"/>
+              <a:defRPr>
+                <a:solidFill>
+                  <a:srgbClr val="002060"/>
+                </a:solidFill>
+              </a:defRPr>
+            </a:lvl1pPr>
+            <a:lvl2pPr marL="1781175" indent="-914400">
+              <a:buFont typeface="Arial" panose="020B0604020202020204" pitchFamily="34" charset="0"/>
+              <a:buChar char="•"/>
+              <a:defRPr sz="6200">
+                <a:solidFill>
+                  <a:srgbClr val="002060"/>
+                </a:solidFill>
+              </a:defRPr>
+            </a:lvl2pPr>
+            <a:lvl3pPr marL="2790825" indent="-962025">
+              <a:buFont typeface="Arial" panose="020B0604020202020204" pitchFamily="34" charset="0"/>
+              <a:buChar char="•"/>
+              <a:defRPr sz="5800">
+                <a:solidFill>
+                  <a:srgbClr val="002060"/>
+                </a:solidFill>
+                <a:latin typeface="Arial"/>
+                <a:cs typeface="Arial"/>
+              </a:defRPr>
+            </a:lvl3pPr>
+            <a:lvl4pPr marL="3657600" indent="-914400">
+              <a:buFont typeface="Arial" panose="020B0604020202020204" pitchFamily="34" charset="0"/>
+              <a:buChar char="•"/>
+              <a:defRPr sz="5800">
+                <a:solidFill>
+                  <a:srgbClr val="002060"/>
+                </a:solidFill>
+              </a:defRPr>
+            </a:lvl4pPr>
+            <a:lvl5pPr marL="4619625" indent="-914400">
+              <a:buFont typeface="Arial" panose="020B0604020202020204" pitchFamily="34" charset="0"/>
+              <a:buChar char="•"/>
+              <a:defRPr sz="5500">
+                <a:solidFill>
+                  <a:srgbClr val="002060"/>
+                </a:solidFill>
+              </a:defRPr>
+            </a:lvl5pPr>
+          </a:lstStyle>
+          <a:p>
+            <a:pPr lvl="0"/>
+            <a:r>
+              <a:rPr lang="en-US" dirty="0"/>
+              <a:t>Edit Master text styles</a:t>
+            </a:r>
+          </a:p>
+          <a:p>
+            <a:pPr lvl="1"/>
+            <a:r>
+              <a:rPr lang="en-US" dirty="0"/>
+              <a:t>Second level</a:t>
+            </a:r>
+          </a:p>
+          <a:p>
+            <a:pPr lvl="2"/>
+            <a:r>
+              <a:rPr lang="en-US" dirty="0"/>
+              <a:t>Third level</a:t>
+            </a:r>
+          </a:p>
+          <a:p>
+            <a:pPr lvl="3"/>
+            <a:r>
+              <a:rPr lang="en-US" dirty="0"/>
+              <a:t>Fourth level</a:t>
+            </a:r>
+          </a:p>
+          <a:p>
+            <a:pPr lvl="4"/>
+            <a:r>
+              <a:rPr lang="en-US" dirty="0"/>
+              <a:t>Fifth level</a:t>
+            </a:r>
+          </a:p>
+        </p:txBody>
+      </p:sp>
+      <p:sp>
+        <p:nvSpPr>
+          <p:cNvPr id="20" name="Content Placeholder 4">
+            <a:extLst>
+              <a:ext uri="{FF2B5EF4-FFF2-40B4-BE49-F238E27FC236}">
+                <a16:creationId xmlns:a16="http://schemas.microsoft.com/office/drawing/2014/main" id="{D90EA65D-9975-4E2B-AB88-9F57E77A7E98}"/>
+              </a:ext>
+            </a:extLst>
+          </p:cNvPr>
+          <p:cNvSpPr>
+            <a:spLocks noGrp="1"/>
+          </p:cNvSpPr>
+          <p:nvPr>
+            <p:ph sz="quarter" idx="19"/>
+          </p:nvPr>
+        </p:nvSpPr>
+        <p:spPr>
+          <a:xfrm>
+            <a:off x="12847320" y="5614727"/>
+            <a:ext cx="11773421" cy="14121074"/>
+          </a:xfrm>
+          <a:prstGeom prst="rect">
+            <a:avLst/>
+          </a:prstGeom>
+          <a:solidFill>
+            <a:schemeClr val="bg1"/>
+          </a:solidFill>
+        </p:spPr>
+        <p:txBody>
+          <a:bodyPr lIns="102669" tIns="51334" rIns="102669" bIns="51334"/>
+          <a:lstStyle>
+            <a:lvl1pPr marL="857250" indent="-857250">
+              <a:buFont typeface="Arial" panose="020B0604020202020204" pitchFamily="34" charset="0"/>
+              <a:buChar char="•"/>
+              <a:defRPr>
+                <a:solidFill>
+                  <a:srgbClr val="002060"/>
+                </a:solidFill>
+              </a:defRPr>
+            </a:lvl1pPr>
+            <a:lvl2pPr marL="1781175" indent="-914400">
+              <a:buFont typeface="Arial" panose="020B0604020202020204" pitchFamily="34" charset="0"/>
+              <a:buChar char="•"/>
+              <a:defRPr sz="6200">
+                <a:solidFill>
+                  <a:srgbClr val="002060"/>
+                </a:solidFill>
+              </a:defRPr>
+            </a:lvl2pPr>
+            <a:lvl3pPr marL="2790825" indent="-962025">
+              <a:buFont typeface="Arial" panose="020B0604020202020204" pitchFamily="34" charset="0"/>
+              <a:buChar char="•"/>
+              <a:defRPr sz="5800">
+                <a:solidFill>
+                  <a:srgbClr val="002060"/>
+                </a:solidFill>
+                <a:latin typeface="Arial"/>
+                <a:cs typeface="Arial"/>
+              </a:defRPr>
+            </a:lvl3pPr>
+            <a:lvl4pPr marL="3657600" indent="-914400">
+              <a:buFont typeface="Arial" panose="020B0604020202020204" pitchFamily="34" charset="0"/>
+              <a:buChar char="•"/>
+              <a:defRPr sz="5800">
+                <a:solidFill>
+                  <a:srgbClr val="002060"/>
+                </a:solidFill>
+              </a:defRPr>
+            </a:lvl4pPr>
+            <a:lvl5pPr marL="4619625" indent="-914400">
+              <a:buFont typeface="Arial" panose="020B0604020202020204" pitchFamily="34" charset="0"/>
+              <a:buChar char="•"/>
+              <a:defRPr sz="5500">
+                <a:solidFill>
+                  <a:srgbClr val="002060"/>
+                </a:solidFill>
+              </a:defRPr>
+            </a:lvl5pPr>
+          </a:lstStyle>
+          <a:p>
+            <a:pPr lvl="0"/>
+            <a:r>
+              <a:rPr lang="en-US"/>
+              <a:t>Edit Master text styles</a:t>
+            </a:r>
+          </a:p>
+          <a:p>
+            <a:pPr lvl="1"/>
+            <a:r>
+              <a:rPr lang="en-US"/>
+              <a:t>Second level</a:t>
+            </a:r>
+          </a:p>
+          <a:p>
+            <a:pPr lvl="2"/>
+            <a:r>
+              <a:rPr lang="en-US"/>
+              <a:t>Third level</a:t>
+            </a:r>
+          </a:p>
+          <a:p>
+            <a:pPr lvl="3"/>
+            <a:r>
+              <a:rPr lang="en-US"/>
+              <a:t>Fourth level</a:t>
+            </a:r>
+          </a:p>
+          <a:p>
+            <a:pPr lvl="4"/>
+            <a:r>
+              <a:rPr lang="en-US"/>
+              <a:t>Fifth level</a:t>
+            </a:r>
+            <a:endParaRPr lang="en-US" dirty="0"/>
+          </a:p>
+        </p:txBody>
+      </p:sp>
+      <p:sp>
+        <p:nvSpPr>
+          <p:cNvPr id="21" name="Text Placeholder 4">
+            <a:extLst>
+              <a:ext uri="{FF2B5EF4-FFF2-40B4-BE49-F238E27FC236}">
+                <a16:creationId xmlns:a16="http://schemas.microsoft.com/office/drawing/2014/main" id="{5BB2B33E-B73C-49B3-B45D-E3ACFB75C9AF}"/>
+              </a:ext>
+            </a:extLst>
+          </p:cNvPr>
+          <p:cNvSpPr txBox="1">
+            <a:spLocks/>
+          </p:cNvSpPr>
+          <p:nvPr userDrawn="1"/>
+        </p:nvSpPr>
+        <p:spPr>
+          <a:xfrm>
+            <a:off x="342379" y="4419599"/>
+            <a:ext cx="11773421" cy="1219195"/>
+          </a:xfrm>
+          <a:prstGeom prst="rect">
+            <a:avLst/>
+          </a:prstGeom>
+          <a:solidFill>
+            <a:srgbClr val="0D2557"/>
+          </a:solidFill>
+        </p:spPr>
+        <p:txBody>
+          <a:bodyPr vert="horz" lIns="102669" tIns="51334" rIns="102669" bIns="51334" anchor="ctr"/>
+          <a:lstStyle>
+            <a:lvl1pPr marL="0" indent="0" algn="ctr" defTabSz="1672026" rtl="0" eaLnBrk="1" latinLnBrk="0" hangingPunct="1">
+              <a:spcBef>
+                <a:spcPct val="20000"/>
+              </a:spcBef>
+              <a:buFont typeface="Arial"/>
+              <a:buNone/>
+              <a:defRPr sz="4000" u="sng" kern="1200" baseline="0">
+                <a:solidFill>
+                  <a:srgbClr val="FFFFFF"/>
+                </a:solidFill>
+                <a:latin typeface="+mn-lt"/>
+                <a:ea typeface="+mn-ea"/>
+                <a:cs typeface="+mn-cs"/>
+              </a:defRPr>
+            </a:lvl1pPr>
+            <a:lvl2pPr marL="2717042" indent="-1045016" algn="l" defTabSz="1672026" rtl="0" eaLnBrk="1" latinLnBrk="0" hangingPunct="1">
+              <a:spcBef>
+                <a:spcPct val="20000"/>
+              </a:spcBef>
+              <a:buFont typeface="Arial"/>
+              <a:buChar char="–"/>
+              <a:defRPr sz="10200" kern="1200">
+                <a:solidFill>
+                  <a:schemeClr val="tx1"/>
+                </a:solidFill>
+                <a:latin typeface="+mn-lt"/>
+                <a:ea typeface="+mn-ea"/>
+                <a:cs typeface="+mn-cs"/>
+              </a:defRPr>
+            </a:lvl2pPr>
+            <a:lvl3pPr marL="4180065" indent="-836013" algn="l" defTabSz="1672026" rtl="0" eaLnBrk="1" latinLnBrk="0" hangingPunct="1">
+              <a:spcBef>
+                <a:spcPct val="20000"/>
+              </a:spcBef>
+              <a:buFont typeface="Arial"/>
+              <a:buChar char="•"/>
+              <a:defRPr sz="8800" kern="1200">
+                <a:solidFill>
+                  <a:schemeClr val="tx1"/>
+                </a:solidFill>
+                <a:latin typeface="+mn-lt"/>
+                <a:ea typeface="+mn-ea"/>
+                <a:cs typeface="+mn-cs"/>
+              </a:defRPr>
+            </a:lvl3pPr>
+            <a:lvl4pPr marL="5852091" indent="-836013" algn="l" defTabSz="1672026" rtl="0" eaLnBrk="1" latinLnBrk="0" hangingPunct="1">
+              <a:spcBef>
+                <a:spcPct val="20000"/>
+              </a:spcBef>
+              <a:buFont typeface="Arial"/>
+              <a:buChar char="–"/>
+              <a:defRPr sz="7300" kern="1200">
+                <a:solidFill>
+                  <a:schemeClr val="tx1"/>
+                </a:solidFill>
+                <a:latin typeface="+mn-lt"/>
+                <a:ea typeface="+mn-ea"/>
+                <a:cs typeface="+mn-cs"/>
+              </a:defRPr>
+            </a:lvl4pPr>
+            <a:lvl5pPr marL="7524118" indent="-836013" algn="l" defTabSz="1672026" rtl="0" eaLnBrk="1" latinLnBrk="0" hangingPunct="1">
+              <a:spcBef>
+                <a:spcPct val="20000"/>
+              </a:spcBef>
+              <a:buFont typeface="Arial"/>
+              <a:buChar char="»"/>
+              <a:defRPr sz="7300" kern="1200">
+                <a:solidFill>
+                  <a:schemeClr val="tx1"/>
+                </a:solidFill>
+                <a:latin typeface="+mn-lt"/>
+                <a:ea typeface="+mn-ea"/>
+                <a:cs typeface="+mn-cs"/>
+              </a:defRPr>
+            </a:lvl5pPr>
+            <a:lvl6pPr marL="9196144" indent="-836013" algn="l" defTabSz="1672026" rtl="0" eaLnBrk="1" latinLnBrk="0" hangingPunct="1">
+              <a:spcBef>
+                <a:spcPct val="20000"/>
+              </a:spcBef>
+              <a:buFont typeface="Arial"/>
+              <a:buChar char="•"/>
+              <a:defRPr sz="7300" kern="1200">
+                <a:solidFill>
+                  <a:schemeClr val="tx1"/>
+                </a:solidFill>
+                <a:latin typeface="+mn-lt"/>
+                <a:ea typeface="+mn-ea"/>
+                <a:cs typeface="+mn-cs"/>
+              </a:defRPr>
+            </a:lvl6pPr>
+            <a:lvl7pPr marL="10868170" indent="-836013" algn="l" defTabSz="1672026" rtl="0" eaLnBrk="1" latinLnBrk="0" hangingPunct="1">
+              <a:spcBef>
+                <a:spcPct val="20000"/>
+              </a:spcBef>
+              <a:buFont typeface="Arial"/>
+              <a:buChar char="•"/>
+              <a:defRPr sz="7300" kern="1200">
+                <a:solidFill>
+                  <a:schemeClr val="tx1"/>
+                </a:solidFill>
+                <a:latin typeface="+mn-lt"/>
+                <a:ea typeface="+mn-ea"/>
+                <a:cs typeface="+mn-cs"/>
+              </a:defRPr>
+            </a:lvl7pPr>
+            <a:lvl8pPr marL="12540196" indent="-836013" algn="l" defTabSz="1672026" rtl="0" eaLnBrk="1" latinLnBrk="0" hangingPunct="1">
+              <a:spcBef>
+                <a:spcPct val="20000"/>
+              </a:spcBef>
+              <a:buFont typeface="Arial"/>
+              <a:buChar char="•"/>
+              <a:defRPr sz="7300" kern="1200">
+                <a:solidFill>
+                  <a:schemeClr val="tx1"/>
+                </a:solidFill>
+                <a:latin typeface="+mn-lt"/>
+                <a:ea typeface="+mn-ea"/>
+                <a:cs typeface="+mn-cs"/>
+              </a:defRPr>
+            </a:lvl8pPr>
+            <a:lvl9pPr marL="14212222" indent="-836013" algn="l" defTabSz="1672026" rtl="0" eaLnBrk="1" latinLnBrk="0" hangingPunct="1">
+              <a:spcBef>
+                <a:spcPct val="20000"/>
+              </a:spcBef>
+              <a:buFont typeface="Arial"/>
+              <a:buChar char="•"/>
+              <a:defRPr sz="7300" kern="1200">
+                <a:solidFill>
+                  <a:schemeClr val="tx1"/>
+                </a:solidFill>
+                <a:latin typeface="+mn-lt"/>
+                <a:ea typeface="+mn-ea"/>
+                <a:cs typeface="+mn-cs"/>
+              </a:defRPr>
+            </a:lvl9pPr>
+          </a:lstStyle>
+          <a:p>
+            <a:pPr defTabSz="1877351"/>
+            <a:r>
+              <a:rPr lang="en-US" sz="7200" dirty="0">
+                <a:latin typeface="Calibri"/>
+              </a:rPr>
+              <a:t>Phase 1 of TDF Project</a:t>
+            </a:r>
+          </a:p>
+        </p:txBody>
+      </p:sp>
+      <p:sp>
+        <p:nvSpPr>
+          <p:cNvPr id="22" name="Text Placeholder 4">
+            <a:extLst>
+              <a:ext uri="{FF2B5EF4-FFF2-40B4-BE49-F238E27FC236}">
+                <a16:creationId xmlns:a16="http://schemas.microsoft.com/office/drawing/2014/main" id="{77D1DC2F-5434-4F72-957D-E9ABF3F7F584}"/>
+              </a:ext>
+            </a:extLst>
+          </p:cNvPr>
+          <p:cNvSpPr txBox="1">
+            <a:spLocks/>
+          </p:cNvSpPr>
+          <p:nvPr userDrawn="1"/>
+        </p:nvSpPr>
+        <p:spPr>
+          <a:xfrm>
+            <a:off x="25346526" y="4419599"/>
+            <a:ext cx="11777472" cy="1219195"/>
+          </a:xfrm>
+          <a:prstGeom prst="rect">
+            <a:avLst/>
+          </a:prstGeom>
+          <a:solidFill>
+            <a:srgbClr val="0D2557"/>
+          </a:solidFill>
+        </p:spPr>
+        <p:txBody>
+          <a:bodyPr vert="horz" lIns="102669" tIns="51334" rIns="102669" bIns="51334" anchor="ctr"/>
+          <a:lstStyle>
+            <a:lvl1pPr marL="0" indent="0" algn="ctr" defTabSz="1672026" rtl="0" eaLnBrk="1" latinLnBrk="0" hangingPunct="1">
+              <a:spcBef>
+                <a:spcPct val="20000"/>
+              </a:spcBef>
+              <a:buFont typeface="Arial"/>
+              <a:buNone/>
+              <a:defRPr sz="4000" u="sng" kern="1200" baseline="0">
+                <a:solidFill>
+                  <a:srgbClr val="FFFFFF"/>
+                </a:solidFill>
+                <a:latin typeface="+mn-lt"/>
+                <a:ea typeface="+mn-ea"/>
+                <a:cs typeface="+mn-cs"/>
+              </a:defRPr>
+            </a:lvl1pPr>
+            <a:lvl2pPr marL="2717042" indent="-1045016" algn="l" defTabSz="1672026" rtl="0" eaLnBrk="1" latinLnBrk="0" hangingPunct="1">
+              <a:spcBef>
+                <a:spcPct val="20000"/>
+              </a:spcBef>
+              <a:buFont typeface="Arial"/>
+              <a:buChar char="–"/>
+              <a:defRPr sz="10200" kern="1200">
+                <a:solidFill>
+                  <a:schemeClr val="tx1"/>
+                </a:solidFill>
+                <a:latin typeface="+mn-lt"/>
+                <a:ea typeface="+mn-ea"/>
+                <a:cs typeface="+mn-cs"/>
+              </a:defRPr>
+            </a:lvl2pPr>
+            <a:lvl3pPr marL="4180065" indent="-836013" algn="l" defTabSz="1672026" rtl="0" eaLnBrk="1" latinLnBrk="0" hangingPunct="1">
+              <a:spcBef>
+                <a:spcPct val="20000"/>
+              </a:spcBef>
+              <a:buFont typeface="Arial"/>
+              <a:buChar char="•"/>
+              <a:defRPr sz="8800" kern="1200">
+                <a:solidFill>
+                  <a:schemeClr val="tx1"/>
+                </a:solidFill>
+                <a:latin typeface="+mn-lt"/>
+                <a:ea typeface="+mn-ea"/>
+                <a:cs typeface="+mn-cs"/>
+              </a:defRPr>
+            </a:lvl3pPr>
+            <a:lvl4pPr marL="5852091" indent="-836013" algn="l" defTabSz="1672026" rtl="0" eaLnBrk="1" latinLnBrk="0" hangingPunct="1">
+              <a:spcBef>
+                <a:spcPct val="20000"/>
+              </a:spcBef>
+              <a:buFont typeface="Arial"/>
+              <a:buChar char="–"/>
+              <a:defRPr sz="7300" kern="1200">
+                <a:solidFill>
+                  <a:schemeClr val="tx1"/>
+                </a:solidFill>
+                <a:latin typeface="+mn-lt"/>
+                <a:ea typeface="+mn-ea"/>
+                <a:cs typeface="+mn-cs"/>
+              </a:defRPr>
+            </a:lvl4pPr>
+            <a:lvl5pPr marL="7524118" indent="-836013" algn="l" defTabSz="1672026" rtl="0" eaLnBrk="1" latinLnBrk="0" hangingPunct="1">
+              <a:spcBef>
+                <a:spcPct val="20000"/>
+              </a:spcBef>
+              <a:buFont typeface="Arial"/>
+              <a:buChar char="»"/>
+              <a:defRPr sz="7300" kern="1200">
+                <a:solidFill>
+                  <a:schemeClr val="tx1"/>
+                </a:solidFill>
+                <a:latin typeface="+mn-lt"/>
+                <a:ea typeface="+mn-ea"/>
+                <a:cs typeface="+mn-cs"/>
+              </a:defRPr>
+            </a:lvl5pPr>
+            <a:lvl6pPr marL="9196144" indent="-836013" algn="l" defTabSz="1672026" rtl="0" eaLnBrk="1" latinLnBrk="0" hangingPunct="1">
+              <a:spcBef>
+                <a:spcPct val="20000"/>
+              </a:spcBef>
+              <a:buFont typeface="Arial"/>
+              <a:buChar char="•"/>
+              <a:defRPr sz="7300" kern="1200">
+                <a:solidFill>
+                  <a:schemeClr val="tx1"/>
+                </a:solidFill>
+                <a:latin typeface="+mn-lt"/>
+                <a:ea typeface="+mn-ea"/>
+                <a:cs typeface="+mn-cs"/>
+              </a:defRPr>
+            </a:lvl6pPr>
+            <a:lvl7pPr marL="10868170" indent="-836013" algn="l" defTabSz="1672026" rtl="0" eaLnBrk="1" latinLnBrk="0" hangingPunct="1">
+              <a:spcBef>
+                <a:spcPct val="20000"/>
+              </a:spcBef>
+              <a:buFont typeface="Arial"/>
+              <a:buChar char="•"/>
+              <a:defRPr sz="7300" kern="1200">
+                <a:solidFill>
+                  <a:schemeClr val="tx1"/>
+                </a:solidFill>
+                <a:latin typeface="+mn-lt"/>
+                <a:ea typeface="+mn-ea"/>
+                <a:cs typeface="+mn-cs"/>
+              </a:defRPr>
+            </a:lvl7pPr>
+            <a:lvl8pPr marL="12540196" indent="-836013" algn="l" defTabSz="1672026" rtl="0" eaLnBrk="1" latinLnBrk="0" hangingPunct="1">
+              <a:spcBef>
+                <a:spcPct val="20000"/>
+              </a:spcBef>
+              <a:buFont typeface="Arial"/>
+              <a:buChar char="•"/>
+              <a:defRPr sz="7300" kern="1200">
+                <a:solidFill>
+                  <a:schemeClr val="tx1"/>
+                </a:solidFill>
+                <a:latin typeface="+mn-lt"/>
+                <a:ea typeface="+mn-ea"/>
+                <a:cs typeface="+mn-cs"/>
+              </a:defRPr>
+            </a:lvl8pPr>
+            <a:lvl9pPr marL="14212222" indent="-836013" algn="l" defTabSz="1672026" rtl="0" eaLnBrk="1" latinLnBrk="0" hangingPunct="1">
+              <a:spcBef>
+                <a:spcPct val="20000"/>
+              </a:spcBef>
+              <a:buFont typeface="Arial"/>
+              <a:buChar char="•"/>
+              <a:defRPr sz="7300" kern="1200">
+                <a:solidFill>
+                  <a:schemeClr val="tx1"/>
+                </a:solidFill>
+                <a:latin typeface="+mn-lt"/>
+                <a:ea typeface="+mn-ea"/>
+                <a:cs typeface="+mn-cs"/>
+              </a:defRPr>
+            </a:lvl9pPr>
+          </a:lstStyle>
+          <a:p>
+            <a:pPr marL="0" marR="0" lvl="0" indent="0" algn="ctr" defTabSz="1877351" rtl="0" eaLnBrk="1" fontAlgn="auto" latinLnBrk="0" hangingPunct="1">
+              <a:lnSpc>
+                <a:spcPct val="100000"/>
+              </a:lnSpc>
+              <a:spcBef>
+                <a:spcPct val="20000"/>
+              </a:spcBef>
+              <a:spcAft>
+                <a:spcPts val="0"/>
+              </a:spcAft>
+              <a:buClrTx/>
+              <a:buSzTx/>
+              <a:buFont typeface="Arial"/>
+              <a:buNone/>
+              <a:tabLst/>
+              <a:defRPr/>
+            </a:pPr>
+            <a:r>
+              <a:rPr lang="en-US" sz="7200" dirty="0">
+                <a:latin typeface="Calibri"/>
+              </a:rPr>
+              <a:t>Phase 1: Delivered</a:t>
+            </a:r>
+          </a:p>
+        </p:txBody>
+      </p:sp>
+      <p:sp>
+        <p:nvSpPr>
+          <p:cNvPr id="23" name="Text Placeholder 4">
+            <a:extLst>
+              <a:ext uri="{FF2B5EF4-FFF2-40B4-BE49-F238E27FC236}">
+                <a16:creationId xmlns:a16="http://schemas.microsoft.com/office/drawing/2014/main" id="{F00362B5-7BCA-4912-870E-8431B5D2B51D}"/>
+              </a:ext>
+            </a:extLst>
+          </p:cNvPr>
+          <p:cNvSpPr txBox="1">
+            <a:spLocks/>
+          </p:cNvSpPr>
+          <p:nvPr userDrawn="1"/>
+        </p:nvSpPr>
+        <p:spPr>
+          <a:xfrm>
+            <a:off x="12850468" y="4395532"/>
+            <a:ext cx="11773421" cy="1219195"/>
+          </a:xfrm>
+          <a:prstGeom prst="rect">
+            <a:avLst/>
+          </a:prstGeom>
+          <a:solidFill>
+            <a:srgbClr val="0D2557"/>
+          </a:solidFill>
+        </p:spPr>
+        <p:txBody>
+          <a:bodyPr vert="horz" lIns="102669" tIns="51334" rIns="102669" bIns="51334" anchor="ctr"/>
+          <a:lstStyle>
+            <a:lvl1pPr marL="0" indent="0" algn="ctr" defTabSz="1672026" rtl="0" eaLnBrk="1" latinLnBrk="0" hangingPunct="1">
+              <a:spcBef>
+                <a:spcPct val="20000"/>
+              </a:spcBef>
+              <a:buFont typeface="Arial"/>
+              <a:buNone/>
+              <a:defRPr sz="4000" u="sng" kern="1200" baseline="0">
+                <a:solidFill>
+                  <a:srgbClr val="FFFFFF"/>
+                </a:solidFill>
+                <a:latin typeface="+mn-lt"/>
+                <a:ea typeface="+mn-ea"/>
+                <a:cs typeface="+mn-cs"/>
+              </a:defRPr>
+            </a:lvl1pPr>
+            <a:lvl2pPr marL="2717042" indent="-1045016" algn="l" defTabSz="1672026" rtl="0" eaLnBrk="1" latinLnBrk="0" hangingPunct="1">
+              <a:spcBef>
+                <a:spcPct val="20000"/>
+              </a:spcBef>
+              <a:buFont typeface="Arial"/>
+              <a:buChar char="–"/>
+              <a:defRPr sz="10200" kern="1200">
+                <a:solidFill>
+                  <a:schemeClr val="tx1"/>
+                </a:solidFill>
+                <a:latin typeface="+mn-lt"/>
+                <a:ea typeface="+mn-ea"/>
+                <a:cs typeface="+mn-cs"/>
+              </a:defRPr>
+            </a:lvl2pPr>
+            <a:lvl3pPr marL="4180065" indent="-836013" algn="l" defTabSz="1672026" rtl="0" eaLnBrk="1" latinLnBrk="0" hangingPunct="1">
+              <a:spcBef>
+                <a:spcPct val="20000"/>
+              </a:spcBef>
+              <a:buFont typeface="Arial"/>
+              <a:buChar char="•"/>
+              <a:defRPr sz="8800" kern="1200">
+                <a:solidFill>
+                  <a:schemeClr val="tx1"/>
+                </a:solidFill>
+                <a:latin typeface="+mn-lt"/>
+                <a:ea typeface="+mn-ea"/>
+                <a:cs typeface="+mn-cs"/>
+              </a:defRPr>
+            </a:lvl3pPr>
+            <a:lvl4pPr marL="5852091" indent="-836013" algn="l" defTabSz="1672026" rtl="0" eaLnBrk="1" latinLnBrk="0" hangingPunct="1">
+              <a:spcBef>
+                <a:spcPct val="20000"/>
+              </a:spcBef>
+              <a:buFont typeface="Arial"/>
+              <a:buChar char="–"/>
+              <a:defRPr sz="7300" kern="1200">
+                <a:solidFill>
+                  <a:schemeClr val="tx1"/>
+                </a:solidFill>
+                <a:latin typeface="+mn-lt"/>
+                <a:ea typeface="+mn-ea"/>
+                <a:cs typeface="+mn-cs"/>
+              </a:defRPr>
+            </a:lvl4pPr>
+            <a:lvl5pPr marL="7524118" indent="-836013" algn="l" defTabSz="1672026" rtl="0" eaLnBrk="1" latinLnBrk="0" hangingPunct="1">
+              <a:spcBef>
+                <a:spcPct val="20000"/>
+              </a:spcBef>
+              <a:buFont typeface="Arial"/>
+              <a:buChar char="»"/>
+              <a:defRPr sz="7300" kern="1200">
+                <a:solidFill>
+                  <a:schemeClr val="tx1"/>
+                </a:solidFill>
+                <a:latin typeface="+mn-lt"/>
+                <a:ea typeface="+mn-ea"/>
+                <a:cs typeface="+mn-cs"/>
+              </a:defRPr>
+            </a:lvl5pPr>
+            <a:lvl6pPr marL="9196144" indent="-836013" algn="l" defTabSz="1672026" rtl="0" eaLnBrk="1" latinLnBrk="0" hangingPunct="1">
+              <a:spcBef>
+                <a:spcPct val="20000"/>
+              </a:spcBef>
+              <a:buFont typeface="Arial"/>
+              <a:buChar char="•"/>
+              <a:defRPr sz="7300" kern="1200">
+                <a:solidFill>
+                  <a:schemeClr val="tx1"/>
+                </a:solidFill>
+                <a:latin typeface="+mn-lt"/>
+                <a:ea typeface="+mn-ea"/>
+                <a:cs typeface="+mn-cs"/>
+              </a:defRPr>
+            </a:lvl6pPr>
+            <a:lvl7pPr marL="10868170" indent="-836013" algn="l" defTabSz="1672026" rtl="0" eaLnBrk="1" latinLnBrk="0" hangingPunct="1">
+              <a:spcBef>
+                <a:spcPct val="20000"/>
+              </a:spcBef>
+              <a:buFont typeface="Arial"/>
+              <a:buChar char="•"/>
+              <a:defRPr sz="7300" kern="1200">
+                <a:solidFill>
+                  <a:schemeClr val="tx1"/>
+                </a:solidFill>
+                <a:latin typeface="+mn-lt"/>
+                <a:ea typeface="+mn-ea"/>
+                <a:cs typeface="+mn-cs"/>
+              </a:defRPr>
+            </a:lvl7pPr>
+            <a:lvl8pPr marL="12540196" indent="-836013" algn="l" defTabSz="1672026" rtl="0" eaLnBrk="1" latinLnBrk="0" hangingPunct="1">
+              <a:spcBef>
+                <a:spcPct val="20000"/>
+              </a:spcBef>
+              <a:buFont typeface="Arial"/>
+              <a:buChar char="•"/>
+              <a:defRPr sz="7300" kern="1200">
+                <a:solidFill>
+                  <a:schemeClr val="tx1"/>
+                </a:solidFill>
+                <a:latin typeface="+mn-lt"/>
+                <a:ea typeface="+mn-ea"/>
+                <a:cs typeface="+mn-cs"/>
+              </a:defRPr>
+            </a:lvl8pPr>
+            <a:lvl9pPr marL="14212222" indent="-836013" algn="l" defTabSz="1672026" rtl="0" eaLnBrk="1" latinLnBrk="0" hangingPunct="1">
+              <a:spcBef>
+                <a:spcPct val="20000"/>
+              </a:spcBef>
+              <a:buFont typeface="Arial"/>
+              <a:buChar char="•"/>
+              <a:defRPr sz="7300" kern="1200">
+                <a:solidFill>
+                  <a:schemeClr val="tx1"/>
+                </a:solidFill>
+                <a:latin typeface="+mn-lt"/>
+                <a:ea typeface="+mn-ea"/>
+                <a:cs typeface="+mn-cs"/>
+              </a:defRPr>
+            </a:lvl9pPr>
+          </a:lstStyle>
+          <a:p>
+            <a:pPr defTabSz="1877351"/>
+            <a:r>
+              <a:rPr lang="en-US" sz="7200" dirty="0">
+                <a:latin typeface="Calibri"/>
+              </a:rPr>
+              <a:t>Updated CDISC Data sets</a:t>
+            </a:r>
+          </a:p>
+        </p:txBody>
+      </p:sp>
+      <p:sp>
+        <p:nvSpPr>
+          <p:cNvPr id="24" name="Picture Placeholder 3">
+            <a:extLst>
+              <a:ext uri="{FF2B5EF4-FFF2-40B4-BE49-F238E27FC236}">
+                <a16:creationId xmlns:a16="http://schemas.microsoft.com/office/drawing/2014/main" id="{A1DB76BB-C8C3-4790-9491-87FF2A6535FD}"/>
+              </a:ext>
+            </a:extLst>
+          </p:cNvPr>
+          <p:cNvSpPr>
+            <a:spLocks noGrp="1"/>
+          </p:cNvSpPr>
+          <p:nvPr>
+            <p:ph type="pic" sz="quarter" idx="10" hasCustomPrompt="1"/>
+          </p:nvPr>
+        </p:nvSpPr>
+        <p:spPr>
+          <a:xfrm>
+            <a:off x="32812038" y="608013"/>
+            <a:ext cx="4373562" cy="3354387"/>
+          </a:xfrm>
+          <a:prstGeom prst="rect">
+            <a:avLst/>
+          </a:prstGeom>
+        </p:spPr>
+        <p:txBody>
+          <a:bodyPr/>
+          <a:lstStyle>
+            <a:lvl1pPr>
+              <a:defRPr/>
+            </a:lvl1pPr>
+          </a:lstStyle>
+          <a:p>
+            <a:r>
+              <a:rPr lang="en-US" dirty="0"/>
+              <a:t>Click to insert logo</a:t>
+            </a:r>
+          </a:p>
+        </p:txBody>
+      </p:sp>
+      <p:sp useBgFill="1">
+        <p:nvSpPr>
+          <p:cNvPr id="10" name="Action Button: Go Home 9">
+            <a:hlinkClick r:id="" action="ppaction://hlinkshowjump?jump=firstslide" highlightClick="1"/>
+            <a:extLst>
+              <a:ext uri="{FF2B5EF4-FFF2-40B4-BE49-F238E27FC236}">
+                <a16:creationId xmlns:a16="http://schemas.microsoft.com/office/drawing/2014/main" id="{8616EB6C-CE79-4168-8042-300FB7EFD3FA}"/>
+              </a:ext>
+            </a:extLst>
+          </p:cNvPr>
+          <p:cNvSpPr/>
+          <p:nvPr userDrawn="1"/>
+        </p:nvSpPr>
+        <p:spPr>
+          <a:xfrm>
+            <a:off x="4892040" y="2788920"/>
+            <a:ext cx="1421188" cy="1607628"/>
+          </a:xfrm>
+          <a:prstGeom prst="actionButtonHome">
+            <a:avLst/>
+          </a:prstGeom>
+          <a:ln>
+            <a:noFill/>
+          </a:ln>
+        </p:spPr>
+        <p:style>
+          <a:lnRef idx="2">
+            <a:schemeClr val="accent1">
+              <a:shade val="50000"/>
+            </a:schemeClr>
+          </a:lnRef>
+          <a:fillRef idx="1">
+            <a:schemeClr val="accent1"/>
+          </a:fillRef>
+          <a:effectRef idx="0">
+            <a:schemeClr val="accent1"/>
+          </a:effectRef>
+          <a:fontRef idx="minor">
+            <a:schemeClr val="lt1"/>
+          </a:fontRef>
+        </p:style>
+        <p:txBody>
+          <a:bodyPr rtlCol="0" anchor="ctr"/>
+          <a:lstStyle/>
+          <a:p>
+            <a:pPr algn="ctr"/>
+            <a:endParaRPr lang="en-US"/>
+          </a:p>
+        </p:txBody>
+      </p:sp>
+      <p:sp useBgFill="1">
+        <p:nvSpPr>
+          <p:cNvPr id="11" name="Action Button: Go Back or Previous 10">
+            <a:hlinkClick r:id="" action="ppaction://hlinkshowjump?jump=previousslide" highlightClick="1"/>
+            <a:extLst>
+              <a:ext uri="{FF2B5EF4-FFF2-40B4-BE49-F238E27FC236}">
+                <a16:creationId xmlns:a16="http://schemas.microsoft.com/office/drawing/2014/main" id="{0CE06E61-4F9F-468D-BBD0-DC87C43C3886}"/>
+              </a:ext>
+            </a:extLst>
+          </p:cNvPr>
+          <p:cNvSpPr/>
+          <p:nvPr userDrawn="1"/>
+        </p:nvSpPr>
+        <p:spPr>
+          <a:xfrm>
+            <a:off x="0" y="19819432"/>
+            <a:ext cx="1515652" cy="1211767"/>
+          </a:xfrm>
+          <a:prstGeom prst="actionButtonBackPrevious">
+            <a:avLst/>
+          </a:prstGeom>
+          <a:ln>
+            <a:solidFill>
+              <a:srgbClr val="2DA2BF"/>
+            </a:solidFill>
+          </a:ln>
+        </p:spPr>
+        <p:style>
+          <a:lnRef idx="2">
+            <a:schemeClr val="accent1">
+              <a:shade val="50000"/>
+            </a:schemeClr>
+          </a:lnRef>
+          <a:fillRef idx="1">
+            <a:schemeClr val="accent1"/>
+          </a:fillRef>
+          <a:effectRef idx="0">
+            <a:schemeClr val="accent1"/>
+          </a:effectRef>
+          <a:fontRef idx="minor">
+            <a:schemeClr val="lt1"/>
+          </a:fontRef>
+        </p:style>
+        <p:txBody>
+          <a:bodyPr rtlCol="0" anchor="ctr"/>
+          <a:lstStyle/>
+          <a:p>
+            <a:pPr algn="ctr"/>
+            <a:endParaRPr lang="en-US"/>
+          </a:p>
+        </p:txBody>
+      </p:sp>
+      <p:sp useBgFill="1">
+        <p:nvSpPr>
+          <p:cNvPr id="12" name="Action Button: Go Forward or Next 11">
+            <a:hlinkClick r:id="" action="ppaction://hlinkshowjump?jump=nextslide" highlightClick="1"/>
+            <a:extLst>
+              <a:ext uri="{FF2B5EF4-FFF2-40B4-BE49-F238E27FC236}">
+                <a16:creationId xmlns:a16="http://schemas.microsoft.com/office/drawing/2014/main" id="{D0EAE5EE-4FB2-4EDD-8F2F-881E4621F6E7}"/>
+              </a:ext>
+            </a:extLst>
+          </p:cNvPr>
+          <p:cNvSpPr/>
+          <p:nvPr userDrawn="1"/>
+        </p:nvSpPr>
+        <p:spPr>
+          <a:xfrm>
+            <a:off x="35814000" y="19819432"/>
+            <a:ext cx="1517904" cy="1211767"/>
+          </a:xfrm>
+          <a:prstGeom prst="actionButtonForwardNext">
+            <a:avLst/>
+          </a:prstGeom>
+          <a:ln>
+            <a:noFill/>
+          </a:ln>
+        </p:spPr>
+        <p:style>
+          <a:lnRef idx="2">
+            <a:schemeClr val="accent1">
+              <a:shade val="50000"/>
+            </a:schemeClr>
+          </a:lnRef>
+          <a:fillRef idx="1">
+            <a:schemeClr val="accent1"/>
+          </a:fillRef>
+          <a:effectRef idx="0">
+            <a:schemeClr val="accent1"/>
+          </a:effectRef>
+          <a:fontRef idx="minor">
+            <a:schemeClr val="lt1"/>
+          </a:fontRef>
+        </p:style>
+        <p:txBody>
+          <a:bodyPr rtlCol="0" anchor="ctr"/>
+          <a:lstStyle/>
+          <a:p>
+            <a:pPr algn="ctr"/>
+            <a:endParaRPr lang="en-US"/>
+          </a:p>
+        </p:txBody>
+      </p:sp>
+    </p:spTree>
+    <p:extLst>
+      <p:ext uri="{BB962C8B-B14F-4D97-AF65-F5344CB8AC3E}">
+        <p14:creationId xmlns:p14="http://schemas.microsoft.com/office/powerpoint/2010/main" val="701667009"/>
+      </p:ext>
+    </p:extLst>
+  </p:cSld>
+  <p:clrMapOvr>
+    <a:masterClrMapping/>
+  </p:clrMapOvr>
+</p:sldLayout>
+</file>
+
+<file path=ppt/slideLayouts/slideLayout11.xml><?xml version="1.0" encoding="utf-8"?>
+<p:sldLayout xmlns:a="http://schemas.openxmlformats.org/drawingml/2006/main" xmlns:r="http://schemas.openxmlformats.org/officeDocument/2006/relationships" xmlns:p="http://schemas.openxmlformats.org/presentationml/2006/main" preserve="1" userDrawn="1">
   <p:cSld name="1_Custom Layout">
     <p:spTree>
       <p:nvGrpSpPr>
@@ -1529,7 +2678,7 @@
               <a:rPr lang="en-US" sz="7200" dirty="0">
                 <a:latin typeface="Calibri"/>
               </a:rPr>
-              <a:t>Phase 1 of TDF Project</a:t>
+              <a:t>CLICK TO EDIT</a:t>
             </a:r>
           </a:p>
         </p:txBody>
@@ -1705,7 +2854,7 @@
               <a:rPr lang="en-US" sz="7200" dirty="0">
                 <a:latin typeface="Calibri"/>
               </a:rPr>
-              <a:t>Phase 1: Completed</a:t>
+              <a:t>CLICK TO EDIT</a:t>
             </a:r>
           </a:p>
         </p:txBody>
@@ -1881,7 +3030,7 @@
               <a:rPr lang="en-US" sz="7200" dirty="0">
                 <a:latin typeface="Calibri"/>
               </a:rPr>
-              <a:t>Phase 1: Delivered</a:t>
+              <a:t>CLICK TO EDIT</a:t>
             </a:r>
           </a:p>
         </p:txBody>
@@ -2057,7 +3206,7 @@
               <a:rPr lang="en-US" sz="7200" dirty="0">
                 <a:latin typeface="Calibri"/>
               </a:rPr>
-              <a:t>Updated CDISC Pilot Data sets</a:t>
+              <a:t>CLICK TO EDIT</a:t>
             </a:r>
           </a:p>
         </p:txBody>
@@ -10554,7 +11703,7 @@
           <p:nvPr userDrawn="1"/>
         </p:nvPicPr>
         <p:blipFill>
-          <a:blip r:embed="rId12" cstate="print">
+          <a:blip r:embed="rId13" cstate="print">
             <a:extLst>
               <a:ext uri="{28A0092B-C50C-407E-A947-70E740481C1C}">
                 <a14:useLocalDpi xmlns:a14="http://schemas.microsoft.com/office/drawing/2010/main" val="0"/>
@@ -10591,7 +11740,8 @@
     <p:sldLayoutId id="2147483658" r:id="rId7"/>
     <p:sldLayoutId id="2147483659" r:id="rId8"/>
     <p:sldLayoutId id="2147483660" r:id="rId9"/>
-    <p:sldLayoutId id="2147483661" r:id="rId10"/>
+    <p:sldLayoutId id="2147483662" r:id="rId10"/>
+    <p:sldLayoutId id="2147483661" r:id="rId11"/>
   </p:sldLayoutIdLst>
   <p:txStyles>
     <p:titleStyle>
@@ -11114,7 +12264,7 @@
         </p:nvSpPr>
         <p:spPr/>
         <p:txBody>
-          <a:bodyPr/>
+          <a:bodyPr lIns="182880" tIns="365760" rIns="365760" bIns="182880"/>
           <a:lstStyle/>
           <a:p>
             <a:pPr>
@@ -11125,7 +12275,9 @@
                 <a:spcPts val="2400"/>
               </a:spcAft>
             </a:pPr>
-            <a:endParaRPr lang="en-US" b="1" dirty="0"/>
+            <a:endParaRPr lang="en-US" b="1" dirty="0">
+              <a:latin typeface="+mn-lt"/>
+            </a:endParaRPr>
           </a:p>
           <a:p>
             <a:pPr>
@@ -11137,11 +12289,15 @@
               </a:spcAft>
             </a:pPr>
             <a:r>
-              <a:rPr lang="en-US" b="1" dirty="0"/>
+              <a:rPr lang="en-US" b="1" dirty="0">
+                <a:latin typeface="+mn-lt"/>
+              </a:rPr>
               <a:t>In 2007,</a:t>
             </a:r>
             <a:r>
-              <a:rPr lang="en-US" dirty="0"/>
+              <a:rPr lang="en-US" dirty="0">
+                <a:latin typeface="+mn-lt"/>
+              </a:rPr>
               <a:t> CDISC published a CDISC Pilot Project submission package.</a:t>
             </a:r>
           </a:p>
@@ -11155,11 +12311,15 @@
               </a:spcAft>
             </a:pPr>
             <a:r>
-              <a:rPr lang="en-US" b="1" dirty="0"/>
+              <a:rPr lang="en-US" b="1" dirty="0">
+                <a:latin typeface="+mn-lt"/>
+              </a:rPr>
               <a:t>In 2013,</a:t>
             </a:r>
             <a:r>
-              <a:rPr lang="en-US" dirty="0"/>
+              <a:rPr lang="en-US" dirty="0">
+                <a:latin typeface="+mn-lt"/>
+              </a:rPr>
               <a:t> CDISC updated their Pilot Project.</a:t>
             </a:r>
           </a:p>
@@ -11173,11 +12333,15 @@
               </a:spcAft>
             </a:pPr>
             <a:r>
-              <a:rPr lang="en-US" b="1" dirty="0"/>
+              <a:rPr lang="en-US" b="1" dirty="0">
+                <a:latin typeface="+mn-lt"/>
+              </a:rPr>
               <a:t>In 2018,</a:t>
             </a:r>
             <a:r>
-              <a:rPr lang="en-US" dirty="0"/>
+              <a:rPr lang="en-US" dirty="0">
+                <a:latin typeface="+mn-lt"/>
+              </a:rPr>
               <a:t> the TDF team updated the 2013 CDISC pilot data packages</a:t>
             </a:r>
           </a:p>
@@ -11185,10 +12349,10 @@
       </p:sp>
       <p:sp>
         <p:nvSpPr>
-          <p:cNvPr id="12" name="Content Placeholder 11">
+          <p:cNvPr id="4" name="Content Placeholder 3">
             <a:extLst>
               <a:ext uri="{FF2B5EF4-FFF2-40B4-BE49-F238E27FC236}">
-                <a16:creationId xmlns:a16="http://schemas.microsoft.com/office/drawing/2014/main" id="{974345E0-27DA-4D3E-9FAA-B249C1E0FEDD}"/>
+                <a16:creationId xmlns:a16="http://schemas.microsoft.com/office/drawing/2014/main" id="{1C37258D-FF4C-4D18-A9D7-8930CF17D1B6}"/>
               </a:ext>
             </a:extLst>
           </p:cNvPr>
@@ -11196,12 +12360,12 @@
             <a:spLocks noGrp="1"/>
           </p:cNvSpPr>
           <p:nvPr>
-            <p:ph sz="quarter" idx="18"/>
+            <p:ph sz="quarter" idx="19"/>
           </p:nvPr>
         </p:nvSpPr>
         <p:spPr/>
         <p:txBody>
-          <a:bodyPr/>
+          <a:bodyPr lIns="182880" tIns="365760" rIns="365760" bIns="182880"/>
           <a:lstStyle/>
           <a:p>
             <a:pPr>
@@ -11214,7 +12378,7 @@
             </a:pPr>
             <a:r>
               <a:rPr lang="en-US" dirty="0"/>
-              <a:t>The TDF team has published two test data packages based on CDISC pilot data</a:t>
+              <a:t>The TDF team published two test data packages based on CDISC pilot data</a:t>
             </a:r>
           </a:p>
           <a:p>
@@ -11236,6 +12400,22 @@
             </a:r>
           </a:p>
           <a:p>
+            <a:pPr lvl="1">
+              <a:spcBef>
+                <a:spcPts val="2400"/>
+              </a:spcBef>
+              <a:spcAft>
+                <a:spcPts val="2400"/>
+              </a:spcAft>
+              <a:buFont typeface="Courier New" panose="02070309020205020404" pitchFamily="49" charset="0"/>
+              <a:buChar char="o"/>
+            </a:pPr>
+            <a:r>
+              <a:rPr lang="en-US" sz="5800" dirty="0"/>
+              <a:t>SDTM IG Version 3.2, and SDTM Model Version 1.6</a:t>
+            </a:r>
+          </a:p>
+          <a:p>
             <a:pPr>
               <a:spcBef>
                 <a:spcPts val="2400"/>
@@ -11253,65 +12433,24 @@
               <a:t> data sets</a:t>
             </a:r>
           </a:p>
-        </p:txBody>
-      </p:sp>
-      <p:pic>
-        <p:nvPicPr>
-          <p:cNvPr id="3" name="Content Placeholder 2">
-            <a:extLst>
-              <a:ext uri="{FF2B5EF4-FFF2-40B4-BE49-F238E27FC236}">
-                <a16:creationId xmlns:a16="http://schemas.microsoft.com/office/drawing/2014/main" id="{A55E55E9-6D34-40ED-BCF1-010341DBBED3}"/>
-              </a:ext>
-            </a:extLst>
-          </p:cNvPr>
-          <p:cNvPicPr>
-            <a:picLocks noGrp="1" noChangeAspect="1"/>
-          </p:cNvPicPr>
-          <p:nvPr>
-            <p:ph sz="quarter" idx="19"/>
-          </p:nvPr>
-        </p:nvPicPr>
-        <p:blipFill>
-          <a:blip r:embed="rId3">
-            <a:extLst>
-              <a:ext uri="{28A0092B-C50C-407E-A947-70E740481C1C}">
-                <a14:useLocalDpi xmlns:a14="http://schemas.microsoft.com/office/drawing/2010/main" val="0"/>
-              </a:ext>
-            </a:extLst>
-          </a:blip>
-          <a:stretch>
-            <a:fillRect/>
-          </a:stretch>
-        </p:blipFill>
-        <p:spPr>
-          <a:xfrm>
-            <a:off x="28117800" y="5791200"/>
-            <a:ext cx="6287377" cy="6811327"/>
-          </a:xfrm>
-        </p:spPr>
-      </p:pic>
-      <p:sp>
-        <p:nvSpPr>
-          <p:cNvPr id="14" name="Content Placeholder 13">
-            <a:extLst>
-              <a:ext uri="{FF2B5EF4-FFF2-40B4-BE49-F238E27FC236}">
-                <a16:creationId xmlns:a16="http://schemas.microsoft.com/office/drawing/2014/main" id="{0EB509FA-4DDA-4093-8D51-2451B49A8DDA}"/>
-              </a:ext>
-            </a:extLst>
-          </p:cNvPr>
-          <p:cNvSpPr>
-            <a:spLocks noGrp="1"/>
-          </p:cNvSpPr>
-          <p:nvPr>
-            <p:ph sz="quarter" idx="20"/>
-          </p:nvPr>
-        </p:nvSpPr>
-        <p:spPr/>
-        <p:txBody>
-          <a:bodyPr/>
-          <a:lstStyle/>
-          <a:p>
-            <a:pPr>
+          <a:p>
+            <a:pPr lvl="1">
+              <a:spcBef>
+                <a:spcPts val="600"/>
+              </a:spcBef>
+              <a:spcAft>
+                <a:spcPts val="600"/>
+              </a:spcAft>
+              <a:buFont typeface="Courier New" panose="02070309020205020404" pitchFamily="49" charset="0"/>
+              <a:buChar char="o"/>
+            </a:pPr>
+            <a:r>
+              <a:rPr lang="en-US" sz="5800" dirty="0"/>
+              <a:t>ADaM IG Version 1.1, and ADaM Model Version 2.1</a:t>
+            </a:r>
+          </a:p>
+          <a:p>
+            <a:pPr lvl="0">
               <a:spcBef>
                 <a:spcPts val="600"/>
               </a:spcBef>
@@ -11320,12 +12459,21 @@
               </a:spcAft>
             </a:pPr>
             <a:r>
-              <a:rPr lang="en-US" sz="6800" dirty="0"/>
-              <a:t>SDTM IG Version 3.2, and SDTM Model Version 1.6</a:t>
-            </a:r>
-          </a:p>
-          <a:p>
-            <a:pPr lvl="0">
+              <a:rPr lang="en-US" sz="6000" dirty="0"/>
+              <a:t>Including </a:t>
+            </a:r>
+            <a:r>
+              <a:rPr lang="en-US" sz="6000" b="1" dirty="0"/>
+              <a:t>define.xml</a:t>
+            </a:r>
+            <a:r>
+              <a:rPr lang="en-US" sz="6000" dirty="0"/>
+              <a:t> files</a:t>
+            </a:r>
+            <a:endParaRPr lang="en-US" sz="6000" b="1" dirty="0"/>
+          </a:p>
+          <a:p>
+            <a:pPr>
               <a:spcBef>
                 <a:spcPts val="600"/>
               </a:spcBef>
@@ -11334,62 +12482,25 @@
               </a:spcAft>
             </a:pPr>
             <a:r>
-              <a:rPr lang="en-US" sz="6600" dirty="0"/>
-              <a:t>ADaM IG Version 1.1, and ADaM Model Version 2.1</a:t>
-            </a:r>
-          </a:p>
-          <a:p>
-            <a:pPr lvl="0">
-              <a:spcBef>
-                <a:spcPts val="600"/>
-              </a:spcBef>
-              <a:spcAft>
-                <a:spcPts val="600"/>
-              </a:spcAft>
-            </a:pPr>
-            <a:r>
-              <a:rPr lang="en-US" sz="6600" dirty="0"/>
-              <a:t>Documentation includes define.xml</a:t>
-            </a:r>
-          </a:p>
-          <a:p>
-            <a:pPr>
-              <a:spcBef>
-                <a:spcPts val="600"/>
-              </a:spcBef>
-              <a:spcAft>
-                <a:spcPts val="600"/>
-              </a:spcAft>
-            </a:pPr>
-            <a:r>
-              <a:rPr lang="en-US" sz="6600" dirty="0"/>
-              <a:t>Published in out project </a:t>
-            </a:r>
-            <a:r>
-              <a:rPr lang="en-US" sz="6600" dirty="0" err="1"/>
+              <a:rPr lang="en-US" sz="6000" dirty="0"/>
+              <a:t>Published in </a:t>
+            </a:r>
+            <a:r>
+              <a:rPr lang="en-US" sz="6000" dirty="0" err="1">
+                <a:hlinkClick r:id="rId3"/>
+              </a:rPr>
               <a:t>Github</a:t>
             </a:r>
             <a:r>
-              <a:rPr lang="en-US" sz="6600" dirty="0"/>
-              <a:t> repository:</a:t>
-            </a:r>
-          </a:p>
-          <a:p>
-            <a:pPr>
-              <a:spcBef>
-                <a:spcPts val="600"/>
-              </a:spcBef>
-              <a:spcAft>
-                <a:spcPts val="600"/>
-              </a:spcAft>
-            </a:pPr>
-            <a:r>
-              <a:rPr lang="en-US" sz="6000" u="sng" dirty="0">
-                <a:hlinkClick r:id="rId4"/>
+              <a:rPr lang="en-US" sz="6000" dirty="0">
+                <a:hlinkClick r:id="rId3"/>
               </a:rPr>
-              <a:t>https://github.com/phuse-org/TestDataFactory/tree/master/Updated</a:t>
-            </a:r>
-            <a:endParaRPr lang="en-US" sz="6000" dirty="0"/>
+              <a:t> repo</a:t>
+            </a:r>
+            <a:endParaRPr lang="en-US" sz="5400" dirty="0"/>
+          </a:p>
+          <a:p>
+            <a:endParaRPr lang="en-US" dirty="0"/>
           </a:p>
         </p:txBody>
       </p:sp>
@@ -11410,25 +12521,308 @@
           </p:nvPr>
         </p:nvPicPr>
         <p:blipFill>
-          <a:blip r:embed="rId5">
+          <a:blip r:embed="rId4">
             <a:extLst>
               <a:ext uri="{28A0092B-C50C-407E-A947-70E740481C1C}">
                 <a14:useLocalDpi xmlns:a14="http://schemas.microsoft.com/office/drawing/2010/main" val="0"/>
               </a:ext>
             </a:extLst>
           </a:blip>
-          <a:srcRect t="8298" b="8298"/>
+          <a:srcRect t="1849" b="1849"/>
           <a:stretch>
             <a:fillRect/>
           </a:stretch>
         </p:blipFill>
-        <p:spPr>
-          <a:xfrm>
-            <a:off x="32812038" y="377825"/>
-            <a:ext cx="4373562" cy="2905125"/>
-          </a:xfrm>
-        </p:spPr>
+        <p:spPr/>
       </p:pic>
+      <p:graphicFrame>
+        <p:nvGraphicFramePr>
+          <p:cNvPr id="2" name="Table 2">
+            <a:extLst>
+              <a:ext uri="{FF2B5EF4-FFF2-40B4-BE49-F238E27FC236}">
+                <a16:creationId xmlns:a16="http://schemas.microsoft.com/office/drawing/2014/main" id="{88A4A574-09C2-4C93-B2CC-566500B8147C}"/>
+              </a:ext>
+            </a:extLst>
+          </p:cNvPr>
+          <p:cNvGraphicFramePr>
+            <a:graphicFrameLocks noGrp="1"/>
+          </p:cNvGraphicFramePr>
+          <p:nvPr>
+            <p:extLst>
+              <p:ext uri="{D42A27DB-BD31-4B8C-83A1-F6EECF244321}">
+                <p14:modId xmlns:p14="http://schemas.microsoft.com/office/powerpoint/2010/main" val="2969278642"/>
+              </p:ext>
+            </p:extLst>
+          </p:nvPr>
+        </p:nvGraphicFramePr>
+        <p:xfrm>
+          <a:off x="25352260" y="5638794"/>
+          <a:ext cx="11773421" cy="14121075"/>
+        </p:xfrm>
+        <a:graphic>
+          <a:graphicData uri="http://schemas.openxmlformats.org/drawingml/2006/table">
+            <a:tbl>
+              <a:tblPr firstRow="1" bandRow="1">
+                <a:tableStyleId>{5C22544A-7EE6-4342-B048-85BDC9FD1C3A}</a:tableStyleId>
+              </a:tblPr>
+              <a:tblGrid>
+                <a:gridCol w="11773421">
+                  <a:extLst>
+                    <a:ext uri="{9D8B030D-6E8A-4147-A177-3AD203B41FA5}">
+                      <a16:colId xmlns:a16="http://schemas.microsoft.com/office/drawing/2014/main" val="3747353290"/>
+                    </a:ext>
+                  </a:extLst>
+                </a:gridCol>
+              </a:tblGrid>
+              <a:tr h="3051593">
+                <a:tc>
+                  <a:txBody>
+                    <a:bodyPr/>
+                    <a:lstStyle/>
+                    <a:p>
+                      <a:pPr algn="l"/>
+                      <a:r>
+                        <a:rPr lang="en-US" sz="6400" dirty="0">
+                          <a:solidFill>
+                            <a:srgbClr val="0D2557"/>
+                          </a:solidFill>
+                        </a:rPr>
+                        <a:t>Standard Analyses &amp; Code Sharing</a:t>
+                      </a:r>
+                    </a:p>
+                  </a:txBody>
+                  <a:tcPr marL="365760" marR="365760" marT="365760" marB="91440" anchor="ctr">
+                    <a:lnL w="12700" cap="flat" cmpd="sng" algn="ctr">
+                      <a:solidFill>
+                        <a:schemeClr val="tx1"/>
+                      </a:solidFill>
+                      <a:prstDash val="solid"/>
+                      <a:round/>
+                      <a:headEnd type="none" w="med" len="med"/>
+                      <a:tailEnd type="none" w="med" len="med"/>
+                    </a:lnL>
+                    <a:lnR w="12700" cap="flat" cmpd="sng" algn="ctr">
+                      <a:solidFill>
+                        <a:schemeClr val="tx1"/>
+                      </a:solidFill>
+                      <a:prstDash val="solid"/>
+                      <a:round/>
+                      <a:headEnd type="none" w="med" len="med"/>
+                      <a:tailEnd type="none" w="med" len="med"/>
+                    </a:lnR>
+                    <a:lnT w="12700" cap="flat" cmpd="sng" algn="ctr">
+                      <a:solidFill>
+                        <a:schemeClr val="tx1"/>
+                      </a:solidFill>
+                      <a:prstDash val="solid"/>
+                      <a:round/>
+                      <a:headEnd type="none" w="med" len="med"/>
+                      <a:tailEnd type="none" w="med" len="med"/>
+                    </a:lnT>
+                    <a:lnB w="12700" cap="flat" cmpd="sng" algn="ctr">
+                      <a:solidFill>
+                        <a:schemeClr val="tx1"/>
+                      </a:solidFill>
+                      <a:prstDash val="solid"/>
+                      <a:round/>
+                      <a:headEnd type="none" w="med" len="med"/>
+                      <a:tailEnd type="none" w="med" len="med"/>
+                    </a:lnB>
+                    <a:solidFill>
+                      <a:srgbClr val="62B5E5"/>
+                    </a:solidFill>
+                  </a:tcPr>
+                </a:tc>
+                <a:extLst>
+                  <a:ext uri="{0D108BD9-81ED-4DB2-BD59-A6C34878D82A}">
+                    <a16:rowId xmlns:a16="http://schemas.microsoft.com/office/drawing/2014/main" val="3596988084"/>
+                  </a:ext>
+                </a:extLst>
+              </a:tr>
+              <a:tr h="5534741">
+                <a:tc>
+                  <a:txBody>
+                    <a:bodyPr/>
+                    <a:lstStyle/>
+                    <a:p>
+                      <a:pPr algn="l"/>
+                      <a:r>
+                        <a:rPr lang="en-US" sz="6400" dirty="0"/>
+                        <a:t>Test Dataset Factory: </a:t>
+                      </a:r>
+                      <a:r>
+                        <a:rPr lang="en-US" sz="6400" dirty="0" err="1">
+                          <a:hlinkClick r:id="rId5"/>
+                        </a:rPr>
+                        <a:t>TDF_ADaM</a:t>
+                      </a:r>
+                      <a:r>
+                        <a:rPr lang="en-US" sz="6400" dirty="0">
+                          <a:hlinkClick r:id="rId5"/>
+                        </a:rPr>
+                        <a:t>: </a:t>
+                      </a:r>
+                      <a:r>
+                        <a:rPr lang="en-US" sz="6400" dirty="0" err="1">
+                          <a:hlinkClick r:id="rId5"/>
+                        </a:rPr>
+                        <a:t>ADaMIG</a:t>
+                      </a:r>
+                      <a:r>
+                        <a:rPr lang="en-US" sz="6400" dirty="0">
+                          <a:hlinkClick r:id="rId5"/>
+                        </a:rPr>
+                        <a:t> v1.1 Test Datasets</a:t>
+                      </a:r>
+                      <a:r>
+                        <a:rPr lang="en-US" sz="6400" dirty="0"/>
+                        <a:t> (PDF), </a:t>
+                      </a:r>
+                      <a:r>
+                        <a:rPr lang="en-US" sz="6400" dirty="0">
+                          <a:hlinkClick r:id="rId6"/>
+                        </a:rPr>
+                        <a:t>ADaM zip file</a:t>
+                      </a:r>
+                      <a:r>
+                        <a:rPr lang="en-US" sz="6400" dirty="0"/>
+                        <a:t>. 07-Dec-2018.</a:t>
+                      </a:r>
+                    </a:p>
+                  </a:txBody>
+                  <a:tcPr marL="365760" marR="365760" marT="365760" marB="91440" anchor="ctr">
+                    <a:lnL w="12700" cap="flat" cmpd="sng" algn="ctr">
+                      <a:solidFill>
+                        <a:schemeClr val="tx1"/>
+                      </a:solidFill>
+                      <a:prstDash val="solid"/>
+                      <a:round/>
+                      <a:headEnd type="none" w="med" len="med"/>
+                      <a:tailEnd type="none" w="med" len="med"/>
+                    </a:lnL>
+                    <a:lnR w="12700" cap="flat" cmpd="sng" algn="ctr">
+                      <a:solidFill>
+                        <a:schemeClr val="tx1"/>
+                      </a:solidFill>
+                      <a:prstDash val="solid"/>
+                      <a:round/>
+                      <a:headEnd type="none" w="med" len="med"/>
+                      <a:tailEnd type="none" w="med" len="med"/>
+                    </a:lnR>
+                    <a:lnT w="12700" cap="flat" cmpd="sng" algn="ctr">
+                      <a:solidFill>
+                        <a:schemeClr val="tx1"/>
+                      </a:solidFill>
+                      <a:prstDash val="solid"/>
+                      <a:round/>
+                      <a:headEnd type="none" w="med" len="med"/>
+                      <a:tailEnd type="none" w="med" len="med"/>
+                    </a:lnT>
+                    <a:lnB w="12700" cap="flat" cmpd="sng" algn="ctr">
+                      <a:solidFill>
+                        <a:schemeClr val="tx1"/>
+                      </a:solidFill>
+                      <a:prstDash val="solid"/>
+                      <a:round/>
+                      <a:headEnd type="none" w="med" len="med"/>
+                      <a:tailEnd type="none" w="med" len="med"/>
+                    </a:lnB>
+                    <a:solidFill>
+                      <a:schemeClr val="bg1"/>
+                    </a:solidFill>
+                  </a:tcPr>
+                </a:tc>
+                <a:extLst>
+                  <a:ext uri="{0D108BD9-81ED-4DB2-BD59-A6C34878D82A}">
+                    <a16:rowId xmlns:a16="http://schemas.microsoft.com/office/drawing/2014/main" val="761802863"/>
+                  </a:ext>
+                </a:extLst>
+              </a:tr>
+              <a:tr h="5534741">
+                <a:tc>
+                  <a:txBody>
+                    <a:bodyPr/>
+                    <a:lstStyle/>
+                    <a:p>
+                      <a:pPr algn="l"/>
+                      <a:r>
+                        <a:rPr lang="en-US" sz="6400" dirty="0"/>
+                        <a:t>Test Dataset Factory: </a:t>
+                      </a:r>
+                      <a:r>
+                        <a:rPr lang="en-US" sz="6400" dirty="0">
+                          <a:hlinkClick r:id="rId7"/>
+                        </a:rPr>
+                        <a:t>TDF_SDTM: SDTMIG v3.2 Test Datasets</a:t>
+                      </a:r>
+                      <a:r>
+                        <a:rPr lang="en-US" sz="6400" dirty="0"/>
+                        <a:t> (PDF). </a:t>
+                      </a:r>
+                      <a:r>
+                        <a:rPr lang="en-US" sz="6400" dirty="0">
+                          <a:hlinkClick r:id="rId8"/>
+                        </a:rPr>
+                        <a:t>SDTM zip file</a:t>
+                      </a:r>
+                      <a:r>
+                        <a:rPr lang="en-US" sz="6400" dirty="0"/>
+                        <a:t>. 07-Dec-2018.</a:t>
+                      </a:r>
+                    </a:p>
+                  </a:txBody>
+                  <a:tcPr marL="365760" marR="365760" marT="365760" marB="91440" anchor="ctr">
+                    <a:lnL w="12700" cap="flat" cmpd="sng" algn="ctr">
+                      <a:solidFill>
+                        <a:schemeClr val="tx1"/>
+                      </a:solidFill>
+                      <a:prstDash val="solid"/>
+                      <a:round/>
+                      <a:headEnd type="none" w="med" len="med"/>
+                      <a:tailEnd type="none" w="med" len="med"/>
+                    </a:lnL>
+                    <a:lnR w="12700" cap="flat" cmpd="sng" algn="ctr">
+                      <a:solidFill>
+                        <a:schemeClr val="tx1"/>
+                      </a:solidFill>
+                      <a:prstDash val="solid"/>
+                      <a:round/>
+                      <a:headEnd type="none" w="med" len="med"/>
+                      <a:tailEnd type="none" w="med" len="med"/>
+                    </a:lnR>
+                    <a:lnT w="12700" cap="flat" cmpd="sng" algn="ctr">
+                      <a:solidFill>
+                        <a:schemeClr val="tx1"/>
+                      </a:solidFill>
+                      <a:prstDash val="solid"/>
+                      <a:round/>
+                      <a:headEnd type="none" w="med" len="med"/>
+                      <a:tailEnd type="none" w="med" len="med"/>
+                    </a:lnT>
+                    <a:lnB w="12700" cap="flat" cmpd="sng" algn="ctr">
+                      <a:solidFill>
+                        <a:schemeClr val="tx1"/>
+                      </a:solidFill>
+                      <a:prstDash val="solid"/>
+                      <a:round/>
+                      <a:headEnd type="none" w="med" len="med"/>
+                      <a:tailEnd type="none" w="med" len="med"/>
+                    </a:lnB>
+                    <a:solidFill>
+                      <a:schemeClr val="bg1"/>
+                    </a:solidFill>
+                  </a:tcPr>
+                </a:tc>
+                <a:extLst>
+                  <a:ext uri="{0D108BD9-81ED-4DB2-BD59-A6C34878D82A}">
+                    <a16:rowId xmlns:a16="http://schemas.microsoft.com/office/drawing/2014/main" val="1183058774"/>
+                  </a:ext>
+                </a:extLst>
+              </a:tr>
+            </a:tbl>
+          </a:graphicData>
+        </a:graphic>
+      </p:graphicFrame>
     </p:spTree>
     <p:extLst>
       <p:ext uri="{BB962C8B-B14F-4D97-AF65-F5344CB8AC3E}">
@@ -11505,7 +12899,7 @@
         </p:nvSpPr>
         <p:spPr/>
         <p:txBody>
-          <a:bodyPr/>
+          <a:bodyPr lIns="365760" tIns="365760" rIns="365760" bIns="182880"/>
           <a:lstStyle/>
           <a:p>
             <a:pPr>
@@ -11517,11 +12911,11 @@
               </a:spcAft>
             </a:pPr>
             <a:r>
-              <a:rPr lang="en-US" dirty="0"/>
+              <a:rPr lang="en-US" sz="6000" dirty="0"/>
               <a:t>Next steps: Develop a </a:t>
             </a:r>
             <a:r>
-              <a:rPr lang="en-US" dirty="0">
+              <a:rPr lang="en-US" sz="6000" dirty="0">
                 <a:solidFill>
                   <a:srgbClr val="004EEA"/>
                 </a:solidFill>
@@ -11529,8 +12923,8 @@
               <a:t>framework and syntax</a:t>
             </a:r>
             <a:r>
-              <a:rPr lang="en-US" dirty="0"/>
-              <a:t>, so users can easily describe a clinical study test database</a:t>
+              <a:rPr lang="en-US" sz="6000" dirty="0"/>
+              <a:t>, so users can easily describe a credible clinical study test database</a:t>
             </a:r>
           </a:p>
           <a:p>
@@ -11543,11 +12937,11 @@
               </a:spcAft>
             </a:pPr>
             <a:r>
-              <a:rPr lang="en-US" dirty="0"/>
+              <a:rPr lang="en-US" sz="6000" dirty="0"/>
               <a:t>Variable Modeling: User </a:t>
             </a:r>
             <a:r>
-              <a:rPr lang="en-US" dirty="0">
+              <a:rPr lang="en-US" sz="6000" dirty="0">
                 <a:solidFill>
                   <a:srgbClr val="004EEA"/>
                 </a:solidFill>
@@ -11555,7 +12949,7 @@
               <a:t>configuration</a:t>
             </a:r>
             <a:r>
-              <a:rPr lang="en-US" dirty="0"/>
+              <a:rPr lang="en-US" sz="6000" dirty="0"/>
               <a:t> and TDF simulation of variable types, such as numeric, date/time, controlled terminology</a:t>
             </a:r>
           </a:p>
@@ -11569,11 +12963,11 @@
               </a:spcAft>
             </a:pPr>
             <a:r>
-              <a:rPr lang="en-US" dirty="0"/>
+              <a:rPr lang="en-US" sz="6000" dirty="0"/>
               <a:t>User Interface: Trial Design Matrix workbook vs. Web interface. </a:t>
             </a:r>
             <a:r>
-              <a:rPr lang="en-US" dirty="0">
+              <a:rPr lang="en-US" sz="6000" dirty="0">
                 <a:solidFill>
                   <a:srgbClr val="004EEA"/>
                 </a:solidFill>
@@ -11581,7 +12975,7 @@
               <a:t>See concept </a:t>
             </a:r>
             <a:r>
-              <a:rPr lang="en-US" dirty="0">
+              <a:rPr lang="en-US" sz="6000" dirty="0">
                 <a:solidFill>
                   <a:srgbClr val="004EEA"/>
                 </a:solidFill>
@@ -11589,44 +12983,11 @@
               </a:rPr>
               <a:t></a:t>
             </a:r>
-            <a:endParaRPr lang="en-US" dirty="0">
+            <a:endParaRPr lang="en-US" sz="6000" dirty="0">
               <a:solidFill>
                 <a:srgbClr val="004EEA"/>
               </a:solidFill>
             </a:endParaRPr>
-          </a:p>
-          <a:p>
-            <a:pPr>
-              <a:spcBef>
-                <a:spcPts val="1200"/>
-              </a:spcBef>
-              <a:spcAft>
-                <a:spcPts val="1200"/>
-              </a:spcAft>
-            </a:pPr>
-            <a:r>
-              <a:rPr lang="en-US" dirty="0"/>
-              <a:t>Database </a:t>
-            </a:r>
-            <a:r>
-              <a:rPr lang="en-US" dirty="0">
-                <a:solidFill>
-                  <a:srgbClr val="004EEA"/>
-                </a:solidFill>
-              </a:rPr>
-              <a:t>credibility</a:t>
-            </a:r>
-          </a:p>
-          <a:p>
-            <a:pPr>
-              <a:spcBef>
-                <a:spcPts val="1200"/>
-              </a:spcBef>
-              <a:spcAft>
-                <a:spcPts val="1200"/>
-              </a:spcAft>
-            </a:pPr>
-            <a:endParaRPr lang="en-US" dirty="0"/>
           </a:p>
         </p:txBody>
       </p:sp>
@@ -11648,7 +13009,7 @@
         </p:nvSpPr>
         <p:spPr/>
         <p:txBody>
-          <a:bodyPr/>
+          <a:bodyPr lIns="365760" tIns="365760" rIns="548640" bIns="182880"/>
           <a:lstStyle/>
           <a:p>
             <a:pPr>
@@ -11661,7 +13022,7 @@
             </a:pPr>
             <a:r>
               <a:rPr lang="en-US" sz="6000" dirty="0"/>
-              <a:t>TDF project provides CDISC test datasets, an important contribution to the development and deployment of CDISC-based software solutions.</a:t>
+              <a:t>TDF project provided CDISC test databases, an important contribution to the development of CDISC-based software solutions.</a:t>
             </a:r>
           </a:p>
           <a:p>
@@ -11675,7 +13036,7 @@
             </a:pPr>
             <a:r>
               <a:rPr lang="en-US" sz="6000" dirty="0"/>
-              <a:t>An open, interactive software platform that delivers users with customized test databases remains an appealing achievement. </a:t>
+              <a:t>An open, interactive software platform that delivers users with customized test databases remains an appealing objective. </a:t>
             </a:r>
           </a:p>
           <a:p>
@@ -11689,7 +13050,7 @@
             </a:pPr>
             <a:r>
               <a:rPr lang="en-US" sz="6000" dirty="0"/>
-              <a:t>We welcome your contributions to achieve these objectives.</a:t>
+              <a:t>We welcome your contributions to achieve these goals.</a:t>
             </a:r>
           </a:p>
           <a:p>
@@ -11726,7 +13087,10 @@
           <a:bodyPr/>
           <a:lstStyle/>
           <a:p>
-            <a:endParaRPr lang="en-US"/>
+            <a:pPr marL="0" indent="0">
+              <a:buNone/>
+            </a:pPr>
+            <a:endParaRPr lang="en-US" dirty="0"/>
           </a:p>
         </p:txBody>
       </p:sp>
@@ -11787,7 +13151,7 @@
         </p:blipFill>
         <p:spPr>
           <a:xfrm>
-            <a:off x="13233400" y="5816600"/>
+            <a:off x="13230981" y="5816600"/>
             <a:ext cx="11076819" cy="13760468"/>
           </a:xfrm>
           <a:prstGeom prst="rect">

</xml_diff>

<commit_message>
minor PharmaSUG e-Poster formatting
</commit_message>
<xml_diff>
--- a/Posters/PharmaSUG 2020 - Paper EP-172.pptx
+++ b/Posters/PharmaSUG 2020 - Paper EP-172.pptx
@@ -12550,7 +12550,7 @@
           <p:nvPr>
             <p:extLst>
               <p:ext uri="{D42A27DB-BD31-4B8C-83A1-F6EECF244321}">
-                <p14:modId xmlns:p14="http://schemas.microsoft.com/office/powerpoint/2010/main" val="2969278642"/>
+                <p14:modId xmlns:p14="http://schemas.microsoft.com/office/powerpoint/2010/main" val="2378318040"/>
               </p:ext>
             </p:extLst>
           </p:nvPr>
@@ -12647,45 +12647,45 @@
                     <a:p>
                       <a:pPr algn="l"/>
                       <a:r>
-                        <a:rPr lang="en-US" sz="6400" dirty="0"/>
+                        <a:rPr lang="en-US" sz="6000" dirty="0"/>
                         <a:t>Test Dataset Factory: </a:t>
                       </a:r>
                       <a:r>
-                        <a:rPr lang="en-US" sz="6400" dirty="0" err="1">
+                        <a:rPr lang="en-US" sz="6000" dirty="0" err="1">
                           <a:hlinkClick r:id="rId5"/>
                         </a:rPr>
                         <a:t>TDF_ADaM</a:t>
                       </a:r>
                       <a:r>
-                        <a:rPr lang="en-US" sz="6400" dirty="0">
+                        <a:rPr lang="en-US" sz="6000" dirty="0">
                           <a:hlinkClick r:id="rId5"/>
                         </a:rPr>
                         <a:t>: </a:t>
                       </a:r>
                       <a:r>
-                        <a:rPr lang="en-US" sz="6400" dirty="0" err="1">
+                        <a:rPr lang="en-US" sz="6000" dirty="0" err="1">
                           <a:hlinkClick r:id="rId5"/>
                         </a:rPr>
                         <a:t>ADaMIG</a:t>
                       </a:r>
                       <a:r>
-                        <a:rPr lang="en-US" sz="6400" dirty="0">
+                        <a:rPr lang="en-US" sz="6000" dirty="0">
                           <a:hlinkClick r:id="rId5"/>
                         </a:rPr>
                         <a:t> v1.1 Test Datasets</a:t>
                       </a:r>
                       <a:r>
-                        <a:rPr lang="en-US" sz="6400" dirty="0"/>
+                        <a:rPr lang="en-US" sz="6000" dirty="0"/>
                         <a:t> (PDF), </a:t>
                       </a:r>
                       <a:r>
-                        <a:rPr lang="en-US" sz="6400" dirty="0">
+                        <a:rPr lang="en-US" sz="6000" dirty="0">
                           <a:hlinkClick r:id="rId6"/>
                         </a:rPr>
                         <a:t>ADaM zip file</a:t>
                       </a:r>
                       <a:r>
-                        <a:rPr lang="en-US" sz="6400" dirty="0"/>
+                        <a:rPr lang="en-US" sz="6000" dirty="0"/>
                         <a:t>. 07-Dec-2018.</a:t>
                       </a:r>
                     </a:p>
@@ -12746,27 +12746,27 @@
                     <a:p>
                       <a:pPr algn="l"/>
                       <a:r>
-                        <a:rPr lang="en-US" sz="6400" dirty="0"/>
+                        <a:rPr lang="en-US" sz="6000" dirty="0"/>
                         <a:t>Test Dataset Factory: </a:t>
                       </a:r>
                       <a:r>
-                        <a:rPr lang="en-US" sz="6400" dirty="0">
+                        <a:rPr lang="en-US" sz="6000" dirty="0">
                           <a:hlinkClick r:id="rId7"/>
                         </a:rPr>
                         <a:t>TDF_SDTM: SDTMIG v3.2 Test Datasets</a:t>
                       </a:r>
                       <a:r>
-                        <a:rPr lang="en-US" sz="6400" dirty="0"/>
+                        <a:rPr lang="en-US" sz="6000" dirty="0"/>
                         <a:t> (PDF). </a:t>
                       </a:r>
                       <a:r>
-                        <a:rPr lang="en-US" sz="6400" dirty="0">
+                        <a:rPr lang="en-US" sz="6000" dirty="0">
                           <a:hlinkClick r:id="rId8"/>
                         </a:rPr>
                         <a:t>SDTM zip file</a:t>
                       </a:r>
                       <a:r>
-                        <a:rPr lang="en-US" sz="6400" dirty="0"/>
+                        <a:rPr lang="en-US" sz="6000" dirty="0"/>
                         <a:t>. 07-Dec-2018.</a:t>
                       </a:r>
                     </a:p>

</xml_diff>

<commit_message>
Updated based on team comments. Thanks!
</commit_message>
<xml_diff>
--- a/Posters/PharmaSUG 2020 - Paper EP-172.pptx
+++ b/Posters/PharmaSUG 2020 - Paper EP-172.pptx
@@ -223,7 +223,7 @@
           <a:p>
             <a:fld id="{F639A1A9-5583-FC45-AC93-6F440A88C802}" type="datetimeFigureOut">
               <a:rPr lang="en-US" smtClean="0"/>
-              <a:t>4/23/2020</a:t>
+              <a:t>4/24/2020</a:t>
             </a:fld>
             <a:endParaRPr lang="en-US"/>
           </a:p>
@@ -11861,7 +11861,7 @@
             </a:pPr>
             <a:r>
               <a:rPr lang="en-US" sz="5400" dirty="0"/>
-              <a:t>The TDF team are now implementing </a:t>
+              <a:t>The TDF team is now implementing </a:t>
             </a:r>
             <a:r>
               <a:rPr lang="en-US" sz="5400" b="1" dirty="0">
@@ -12550,7 +12550,7 @@
           <p:nvPr>
             <p:extLst>
               <p:ext uri="{D42A27DB-BD31-4B8C-83A1-F6EECF244321}">
-                <p14:modId xmlns:p14="http://schemas.microsoft.com/office/powerpoint/2010/main" val="2378318040"/>
+                <p14:modId xmlns:p14="http://schemas.microsoft.com/office/powerpoint/2010/main" val="3250688771"/>
               </p:ext>
             </p:extLst>
           </p:nvPr>
@@ -12645,44 +12645,42 @@
                     <a:bodyPr/>
                     <a:lstStyle/>
                     <a:p>
-                      <a:pPr algn="l"/>
+                      <a:pPr marL="0" marR="0" lvl="0" indent="0" algn="l" defTabSz="914400" eaLnBrk="1" fontAlgn="auto" latinLnBrk="0" hangingPunct="1">
+                        <a:lnSpc>
+                          <a:spcPct val="100000"/>
+                        </a:lnSpc>
+                        <a:spcBef>
+                          <a:spcPts val="0"/>
+                        </a:spcBef>
+                        <a:spcAft>
+                          <a:spcPts val="0"/>
+                        </a:spcAft>
+                        <a:buClrTx/>
+                        <a:buSzTx/>
+                        <a:buFontTx/>
+                        <a:buNone/>
+                        <a:tabLst/>
+                        <a:defRPr/>
+                      </a:pPr>
                       <a:r>
                         <a:rPr lang="en-US" sz="6000" dirty="0"/>
                         <a:t>Test Dataset Factory: </a:t>
                       </a:r>
                       <a:r>
-                        <a:rPr lang="en-US" sz="6000" dirty="0" err="1">
-                          <a:hlinkClick r:id="rId5"/>
-                        </a:rPr>
-                        <a:t>TDF_ADaM</a:t>
-                      </a:r>
-                      <a:r>
                         <a:rPr lang="en-US" sz="6000" dirty="0">
                           <a:hlinkClick r:id="rId5"/>
                         </a:rPr>
-                        <a:t>: </a:t>
-                      </a:r>
-                      <a:r>
-                        <a:rPr lang="en-US" sz="6000" dirty="0" err="1">
-                          <a:hlinkClick r:id="rId5"/>
-                        </a:rPr>
-                        <a:t>ADaMIG</a:t>
-                      </a:r>
-                      <a:r>
-                        <a:rPr lang="en-US" sz="6000" dirty="0">
-                          <a:hlinkClick r:id="rId5"/>
-                        </a:rPr>
-                        <a:t> v1.1 Test Datasets</a:t>
+                        <a:t>TDF_SDTM: SDTMIG v3.2 Test Datasets</a:t>
                       </a:r>
                       <a:r>
                         <a:rPr lang="en-US" sz="6000" dirty="0"/>
-                        <a:t> (PDF), </a:t>
+                        <a:t> (PDF). </a:t>
                       </a:r>
                       <a:r>
                         <a:rPr lang="en-US" sz="6000" dirty="0">
                           <a:hlinkClick r:id="rId6"/>
                         </a:rPr>
-                        <a:t>ADaM zip file</a:t>
+                        <a:t>SDTM zip file</a:t>
                       </a:r>
                       <a:r>
                         <a:rPr lang="en-US" sz="6000" dirty="0"/>
@@ -12744,31 +12742,69 @@
                     <a:bodyPr/>
                     <a:lstStyle/>
                     <a:p>
-                      <a:pPr algn="l"/>
+                      <a:pPr marL="0" marR="0" lvl="0" indent="0" algn="l" defTabSz="914400" eaLnBrk="1" fontAlgn="auto" latinLnBrk="0" hangingPunct="1">
+                        <a:lnSpc>
+                          <a:spcPct val="100000"/>
+                        </a:lnSpc>
+                        <a:spcBef>
+                          <a:spcPts val="0"/>
+                        </a:spcBef>
+                        <a:spcAft>
+                          <a:spcPts val="0"/>
+                        </a:spcAft>
+                        <a:buClrTx/>
+                        <a:buSzTx/>
+                        <a:buFontTx/>
+                        <a:buNone/>
+                        <a:tabLst/>
+                        <a:defRPr/>
+                      </a:pPr>
                       <a:r>
                         <a:rPr lang="en-US" sz="6000" dirty="0"/>
                         <a:t>Test Dataset Factory: </a:t>
                       </a:r>
                       <a:r>
+                        <a:rPr lang="en-US" sz="6000" dirty="0" err="1">
+                          <a:hlinkClick r:id="rId7"/>
+                        </a:rPr>
+                        <a:t>TDF_ADaM</a:t>
+                      </a:r>
+                      <a:r>
                         <a:rPr lang="en-US" sz="6000" dirty="0">
                           <a:hlinkClick r:id="rId7"/>
                         </a:rPr>
-                        <a:t>TDF_SDTM: SDTMIG v3.2 Test Datasets</a:t>
+                        <a:t>: </a:t>
+                      </a:r>
+                      <a:r>
+                        <a:rPr lang="en-US" sz="6000" dirty="0" err="1">
+                          <a:hlinkClick r:id="rId7"/>
+                        </a:rPr>
+                        <a:t>ADaMIG</a:t>
+                      </a:r>
+                      <a:r>
+                        <a:rPr lang="en-US" sz="6000" dirty="0">
+                          <a:hlinkClick r:id="rId7"/>
+                        </a:rPr>
+                        <a:t> v1.1 Test Datasets</a:t>
                       </a:r>
                       <a:r>
                         <a:rPr lang="en-US" sz="6000" dirty="0"/>
-                        <a:t> (PDF). </a:t>
+                        <a:t> (PDF), </a:t>
                       </a:r>
                       <a:r>
                         <a:rPr lang="en-US" sz="6000" dirty="0">
                           <a:hlinkClick r:id="rId8"/>
                         </a:rPr>
-                        <a:t>SDTM zip file</a:t>
+                        <a:t>ADaM zip file</a:t>
                       </a:r>
                       <a:r>
                         <a:rPr lang="en-US" sz="6000" dirty="0"/>
                         <a:t>. 07-Dec-2018.</a:t>
                       </a:r>
+                    </a:p>
+                    <a:p>
+                      <a:pPr algn="l"/>
+                      <a:endParaRPr lang="en-US" sz="6000" dirty="0"/>
                     </a:p>
                   </a:txBody>
                   <a:tcPr marL="365760" marR="365760" marT="365760" marB="91440" anchor="ctr">
@@ -12902,20 +12938,24 @@
           <a:bodyPr lIns="365760" tIns="365760" rIns="365760" bIns="182880"/>
           <a:lstStyle/>
           <a:p>
-            <a:pPr>
-              <a:spcBef>
-                <a:spcPts val="1200"/>
+            <a:pPr marL="914400" indent="-914400">
+              <a:spcBef>
+                <a:spcPts val="2400"/>
               </a:spcBef>
               <a:spcAft>
-                <a:spcPts val="1200"/>
+                <a:spcPts val="2400"/>
               </a:spcAft>
             </a:pPr>
             <a:r>
               <a:rPr lang="en-US" sz="6000" dirty="0"/>
-              <a:t>Next steps: Develop a </a:t>
-            </a:r>
-            <a:r>
-              <a:rPr lang="en-US" sz="6000" dirty="0">
+              <a:t>Next steps: </a:t>
+            </a:r>
+            <a:r>
+              <a:rPr lang="en-US" sz="5400" dirty="0"/>
+              <a:t>Develop a </a:t>
+            </a:r>
+            <a:r>
+              <a:rPr lang="en-US" sz="5400" dirty="0">
                 <a:solidFill>
                   <a:srgbClr val="004EEA"/>
                 </a:solidFill>
@@ -12923,25 +12963,29 @@
               <a:t>framework and syntax</a:t>
             </a:r>
             <a:r>
-              <a:rPr lang="en-US" sz="6000" dirty="0"/>
+              <a:rPr lang="en-US" sz="5400" dirty="0"/>
               <a:t>, so users can easily describe a credible clinical study test database</a:t>
             </a:r>
           </a:p>
           <a:p>
-            <a:pPr>
-              <a:spcBef>
-                <a:spcPts val="1200"/>
+            <a:pPr marL="914400" indent="-914400">
+              <a:spcBef>
+                <a:spcPts val="2400"/>
               </a:spcBef>
               <a:spcAft>
-                <a:spcPts val="1200"/>
+                <a:spcPts val="2400"/>
               </a:spcAft>
             </a:pPr>
             <a:r>
               <a:rPr lang="en-US" sz="6000" dirty="0"/>
-              <a:t>Variable Modeling: User </a:t>
-            </a:r>
-            <a:r>
-              <a:rPr lang="en-US" sz="6000" dirty="0">
+              <a:t>Variable Modeling: </a:t>
+            </a:r>
+            <a:r>
+              <a:rPr lang="en-US" sz="5400" dirty="0"/>
+              <a:t>User </a:t>
+            </a:r>
+            <a:r>
+              <a:rPr lang="en-US" sz="5400" dirty="0">
                 <a:solidFill>
                   <a:srgbClr val="004EEA"/>
                 </a:solidFill>
@@ -12949,25 +12993,29 @@
               <a:t>configuration</a:t>
             </a:r>
             <a:r>
-              <a:rPr lang="en-US" sz="6000" dirty="0"/>
+              <a:rPr lang="en-US" sz="5400" dirty="0"/>
               <a:t> and TDF simulation of variable types, such as numeric, date/time, controlled terminology</a:t>
             </a:r>
           </a:p>
           <a:p>
-            <a:pPr>
-              <a:spcBef>
-                <a:spcPts val="1200"/>
+            <a:pPr marL="914400" indent="-914400">
+              <a:spcBef>
+                <a:spcPts val="2400"/>
               </a:spcBef>
               <a:spcAft>
-                <a:spcPts val="1200"/>
+                <a:spcPts val="2400"/>
               </a:spcAft>
             </a:pPr>
             <a:r>
               <a:rPr lang="en-US" sz="6000" dirty="0"/>
-              <a:t>User Interface: Trial Design Matrix workbook vs. Web interface. </a:t>
-            </a:r>
-            <a:r>
-              <a:rPr lang="en-US" sz="6000" dirty="0">
+              <a:t>User Interface: </a:t>
+            </a:r>
+            <a:r>
+              <a:rPr lang="en-US" sz="5400" dirty="0"/>
+              <a:t>Trial Design Matrix Excel workbook vs. Web interface. </a:t>
+            </a:r>
+            <a:r>
+              <a:rPr lang="en-US" sz="5400" dirty="0">
                 <a:solidFill>
                   <a:srgbClr val="004EEA"/>
                 </a:solidFill>
@@ -12975,7 +13023,7 @@
               <a:t>See concept </a:t>
             </a:r>
             <a:r>
-              <a:rPr lang="en-US" sz="6000" dirty="0">
+              <a:rPr lang="en-US" sz="5400" dirty="0">
                 <a:solidFill>
                   <a:srgbClr val="004EEA"/>
                 </a:solidFill>
@@ -12983,7 +13031,7 @@
               </a:rPr>
               <a:t></a:t>
             </a:r>
-            <a:endParaRPr lang="en-US" sz="6000" dirty="0">
+            <a:endParaRPr lang="en-US" sz="5400" dirty="0">
               <a:solidFill>
                 <a:srgbClr val="004EEA"/>
               </a:solidFill>

</xml_diff>